<commit_message>
Many class: categorical cross entry
</commit_message>
<xml_diff>
--- a/ch10_DataModel/ch10_Number_Guesser.pptx
+++ b/ch10_DataModel/ch10_Number_Guesser.pptx
@@ -5,7 +5,7 @@
     <p:sldMasterId id="2147483648" r:id="rId1"/>
   </p:sldMasterIdLst>
   <p:notesMasterIdLst>
-    <p:notesMasterId r:id="rId27"/>
+    <p:notesMasterId r:id="rId29"/>
   </p:notesMasterIdLst>
   <p:sldIdLst>
     <p:sldId id="256" r:id="rId2"/>
@@ -25,14 +25,16 @@
     <p:sldId id="270" r:id="rId16"/>
     <p:sldId id="271" r:id="rId17"/>
     <p:sldId id="258" r:id="rId18"/>
-    <p:sldId id="272" r:id="rId19"/>
-    <p:sldId id="275" r:id="rId20"/>
-    <p:sldId id="274" r:id="rId21"/>
-    <p:sldId id="276" r:id="rId22"/>
-    <p:sldId id="277" r:id="rId23"/>
-    <p:sldId id="278" r:id="rId24"/>
-    <p:sldId id="279" r:id="rId25"/>
-    <p:sldId id="259" r:id="rId26"/>
+    <p:sldId id="287" r:id="rId19"/>
+    <p:sldId id="286" r:id="rId20"/>
+    <p:sldId id="272" r:id="rId21"/>
+    <p:sldId id="275" r:id="rId22"/>
+    <p:sldId id="274" r:id="rId23"/>
+    <p:sldId id="276" r:id="rId24"/>
+    <p:sldId id="277" r:id="rId25"/>
+    <p:sldId id="278" r:id="rId26"/>
+    <p:sldId id="279" r:id="rId27"/>
+    <p:sldId id="259" r:id="rId28"/>
   </p:sldIdLst>
   <p:sldSz cx="9144000" cy="6858000" type="screen4x3"/>
   <p:notesSz cx="6858000" cy="9144000"/>
@@ -233,7 +235,7 @@
             <a:fld id="{6837EDA8-41C8-4B24-A206-13C08A65A6D7}" type="datetimeFigureOut">
               <a:rPr lang="zh-TW" altLang="en-US" smtClean="0"/>
               <a:pPr/>
-              <a:t>2019/4/1</a:t>
+              <a:t>2019/4/6</a:t>
             </a:fld>
             <a:endParaRPr lang="zh-TW" altLang="en-US"/>
           </a:p>
@@ -686,7 +688,7 @@
             <a:fld id="{8B85509C-BD4F-47BF-9B1E-FC2E949B3621}" type="datetime1">
               <a:rPr lang="zh-TW" altLang="en-US" smtClean="0"/>
               <a:pPr/>
-              <a:t>2019/4/1</a:t>
+              <a:t>2019/4/6</a:t>
             </a:fld>
             <a:endParaRPr lang="zh-TW" altLang="en-US"/>
           </a:p>
@@ -859,7 +861,7 @@
             <a:fld id="{42251B24-F787-4C15-8A0F-7AEC20C70069}" type="datetime1">
               <a:rPr lang="zh-TW" altLang="en-US" smtClean="0"/>
               <a:pPr/>
-              <a:t>2019/4/1</a:t>
+              <a:t>2019/4/6</a:t>
             </a:fld>
             <a:endParaRPr lang="zh-TW" altLang="en-US"/>
           </a:p>
@@ -1034,7 +1036,7 @@
             <a:fld id="{9CA0D33C-CE2B-45F1-B8D4-FFD1F131F331}" type="datetime1">
               <a:rPr lang="zh-TW" altLang="en-US" smtClean="0"/>
               <a:pPr/>
-              <a:t>2019/4/1</a:t>
+              <a:t>2019/4/6</a:t>
             </a:fld>
             <a:endParaRPr lang="zh-TW" altLang="en-US"/>
           </a:p>
@@ -1199,7 +1201,7 @@
             <a:fld id="{50B99440-D9EF-40CC-9B52-F6428D9B2C76}" type="datetime1">
               <a:rPr lang="zh-TW" altLang="en-US" smtClean="0"/>
               <a:pPr/>
-              <a:t>2019/4/1</a:t>
+              <a:t>2019/4/6</a:t>
             </a:fld>
             <a:endParaRPr lang="zh-TW" altLang="en-US"/>
           </a:p>
@@ -1441,7 +1443,7 @@
             <a:fld id="{0871BF52-5C6C-4959-8E27-CECB68D39FE4}" type="datetime1">
               <a:rPr lang="zh-TW" altLang="en-US" smtClean="0"/>
               <a:pPr/>
-              <a:t>2019/4/1</a:t>
+              <a:t>2019/4/6</a:t>
             </a:fld>
             <a:endParaRPr lang="zh-TW" altLang="en-US"/>
           </a:p>
@@ -1723,7 +1725,7 @@
             <a:fld id="{DF863F05-2DD9-4EB1-A827-12FD992DE9DC}" type="datetime1">
               <a:rPr lang="zh-TW" altLang="en-US" smtClean="0"/>
               <a:pPr/>
-              <a:t>2019/4/1</a:t>
+              <a:t>2019/4/6</a:t>
             </a:fld>
             <a:endParaRPr lang="zh-TW" altLang="en-US"/>
           </a:p>
@@ -2139,7 +2141,7 @@
             <a:fld id="{6339AF51-4491-4873-A096-75DB6CE47516}" type="datetime1">
               <a:rPr lang="zh-TW" altLang="en-US" smtClean="0"/>
               <a:pPr/>
-              <a:t>2019/4/1</a:t>
+              <a:t>2019/4/6</a:t>
             </a:fld>
             <a:endParaRPr lang="zh-TW" altLang="en-US"/>
           </a:p>
@@ -2253,7 +2255,7 @@
             <a:fld id="{EE4AD9C8-8B9E-40FF-ABE2-858AC2057BBB}" type="datetime1">
               <a:rPr lang="zh-TW" altLang="en-US" smtClean="0"/>
               <a:pPr/>
-              <a:t>2019/4/1</a:t>
+              <a:t>2019/4/6</a:t>
             </a:fld>
             <a:endParaRPr lang="zh-TW" altLang="en-US"/>
           </a:p>
@@ -2345,7 +2347,7 @@
             <a:fld id="{B4784999-BBBE-4BE4-A8D0-877E7D1D66CC}" type="datetime1">
               <a:rPr lang="zh-TW" altLang="en-US" smtClean="0"/>
               <a:pPr/>
-              <a:t>2019/4/1</a:t>
+              <a:t>2019/4/6</a:t>
             </a:fld>
             <a:endParaRPr lang="zh-TW" altLang="en-US"/>
           </a:p>
@@ -2617,7 +2619,7 @@
             <a:fld id="{E88D17E6-02BD-4944-B9FE-7BFCCBF83D48}" type="datetime1">
               <a:rPr lang="zh-TW" altLang="en-US" smtClean="0"/>
               <a:pPr/>
-              <a:t>2019/4/1</a:t>
+              <a:t>2019/4/6</a:t>
             </a:fld>
             <a:endParaRPr lang="zh-TW" altLang="en-US"/>
           </a:p>
@@ -2866,7 +2868,7 @@
             <a:fld id="{3C13E23D-1FEF-4D78-A3A3-3D6F2BB31954}" type="datetime1">
               <a:rPr lang="zh-TW" altLang="en-US" smtClean="0"/>
               <a:pPr/>
-              <a:t>2019/4/1</a:t>
+              <a:t>2019/4/6</a:t>
             </a:fld>
             <a:endParaRPr lang="zh-TW" altLang="en-US"/>
           </a:p>
@@ -3074,7 +3076,7 @@
             <a:fld id="{06197F35-AD6F-4594-8B50-334492D2E7E8}" type="datetime1">
               <a:rPr lang="zh-TW" altLang="en-US" smtClean="0"/>
               <a:pPr/>
-              <a:t>2019/4/1</a:t>
+              <a:t>2019/4/6</a:t>
             </a:fld>
             <a:endParaRPr lang="zh-TW" altLang="en-US"/>
           </a:p>
@@ -3535,7 +3537,7 @@
             <a:fld id="{C389EDC9-19E3-47AC-9C57-C6A24DEA81AD}" type="datetime1">
               <a:rPr lang="zh-TW" altLang="en-US" smtClean="0"/>
               <a:pPr/>
-              <a:t>2019/4/1</a:t>
+              <a:t>2019/4/6</a:t>
             </a:fld>
             <a:endParaRPr lang="zh-TW" altLang="en-US"/>
           </a:p>
@@ -3709,7 +3711,7 @@
             <a:fld id="{C389EDC9-19E3-47AC-9C57-C6A24DEA81AD}" type="datetime1">
               <a:rPr lang="zh-TW" altLang="en-US" smtClean="0"/>
               <a:pPr/>
-              <a:t>2019/4/1</a:t>
+              <a:t>2019/4/6</a:t>
             </a:fld>
             <a:endParaRPr lang="zh-TW" altLang="en-US"/>
           </a:p>
@@ -4007,7 +4009,7 @@
             <a:fld id="{A4F910E6-8D00-4BAF-8C48-9688E0B449D3}" type="datetime1">
               <a:rPr lang="zh-TW" altLang="en-US" smtClean="0"/>
               <a:pPr/>
-              <a:t>2019/4/1</a:t>
+              <a:t>2019/4/6</a:t>
             </a:fld>
             <a:endParaRPr lang="zh-TW" altLang="en-US"/>
           </a:p>
@@ -5781,7 +5783,7 @@
             <a:fld id="{A4F910E6-8D00-4BAF-8C48-9688E0B449D3}" type="datetime1">
               <a:rPr lang="zh-TW" altLang="en-US" smtClean="0"/>
               <a:pPr/>
-              <a:t>2019/4/1</a:t>
+              <a:t>2019/4/6</a:t>
             </a:fld>
             <a:endParaRPr lang="zh-TW" altLang="en-US"/>
           </a:p>
@@ -7245,7 +7247,7 @@
             <a:fld id="{A4F910E6-8D00-4BAF-8C48-9688E0B449D3}" type="datetime1">
               <a:rPr lang="zh-TW" altLang="en-US" smtClean="0"/>
               <a:pPr/>
-              <a:t>2019/4/1</a:t>
+              <a:t>2019/4/6</a:t>
             </a:fld>
             <a:endParaRPr lang="zh-TW" altLang="en-US"/>
           </a:p>
@@ -8080,7 +8082,7 @@
             <a:fld id="{A4F910E6-8D00-4BAF-8C48-9688E0B449D3}" type="datetime1">
               <a:rPr lang="zh-TW" altLang="en-US" smtClean="0"/>
               <a:pPr/>
-              <a:t>2019/4/1</a:t>
+              <a:t>2019/4/6</a:t>
             </a:fld>
             <a:endParaRPr lang="zh-TW" altLang="en-US"/>
           </a:p>
@@ -8598,7 +8600,7 @@
             <a:fld id="{A4F910E6-8D00-4BAF-8C48-9688E0B449D3}" type="datetime1">
               <a:rPr lang="zh-TW" altLang="en-US" smtClean="0"/>
               <a:pPr/>
-              <a:t>2019/4/1</a:t>
+              <a:t>2019/4/6</a:t>
             </a:fld>
             <a:endParaRPr lang="zh-TW" altLang="en-US"/>
           </a:p>
@@ -8845,7 +8847,7 @@
             <a:fld id="{C389EDC9-19E3-47AC-9C57-C6A24DEA81AD}" type="datetime1">
               <a:rPr lang="zh-TW" altLang="en-US" smtClean="0"/>
               <a:pPr/>
-              <a:t>2019/4/1</a:t>
+              <a:t>2019/4/6</a:t>
             </a:fld>
             <a:endParaRPr lang="zh-TW" altLang="en-US"/>
           </a:p>
@@ -8919,6 +8921,1443 @@
 </file>
 
 <file path=ppt/slides/slide17.xml><?xml version="1.0" encoding="utf-8"?>
+<p:sld xmlns:a="http://schemas.openxmlformats.org/drawingml/2006/main" xmlns:r="http://schemas.openxmlformats.org/officeDocument/2006/relationships" xmlns:p="http://schemas.openxmlformats.org/presentationml/2006/main">
+  <p:cSld>
+    <p:spTree>
+      <p:nvGrpSpPr>
+        <p:cNvPr id="1" name=""/>
+        <p:cNvGrpSpPr/>
+        <p:nvPr/>
+      </p:nvGrpSpPr>
+      <p:grpSpPr>
+        <a:xfrm>
+          <a:off x="0" y="0"/>
+          <a:ext cx="0" cy="0"/>
+          <a:chOff x="0" y="0"/>
+          <a:chExt cx="0" cy="0"/>
+        </a:xfrm>
+      </p:grpSpPr>
+      <p:sp>
+        <p:nvSpPr>
+          <p:cNvPr id="2" name="標題 1"/>
+          <p:cNvSpPr>
+            <a:spLocks noGrp="1"/>
+          </p:cNvSpPr>
+          <p:nvPr>
+            <p:ph type="ctrTitle"/>
+          </p:nvPr>
+        </p:nvSpPr>
+        <p:spPr>
+          <a:xfrm>
+            <a:off x="0" y="1"/>
+            <a:ext cx="9144000" cy="764704"/>
+          </a:xfrm>
+          <a:gradFill flip="none" rotWithShape="1">
+            <a:gsLst>
+              <a:gs pos="0">
+                <a:srgbClr val="C00000">
+                  <a:shade val="30000"/>
+                  <a:satMod val="115000"/>
+                </a:srgbClr>
+              </a:gs>
+              <a:gs pos="50000">
+                <a:srgbClr val="C00000">
+                  <a:shade val="67500"/>
+                  <a:satMod val="115000"/>
+                </a:srgbClr>
+              </a:gs>
+              <a:gs pos="100000">
+                <a:srgbClr val="C00000">
+                  <a:shade val="100000"/>
+                  <a:satMod val="115000"/>
+                </a:srgbClr>
+              </a:gs>
+            </a:gsLst>
+            <a:path path="circle">
+              <a:fillToRect t="100000" r="100000"/>
+            </a:path>
+            <a:tileRect l="-100000" b="-100000"/>
+          </a:gradFill>
+        </p:spPr>
+        <p:txBody>
+          <a:bodyPr>
+            <a:normAutofit/>
+          </a:bodyPr>
+          <a:lstStyle/>
+          <a:p>
+            <a:pPr algn="l"/>
+            <a:r>
+              <a:rPr lang="en-US" altLang="zh-TW" b="1" dirty="0">
+                <a:solidFill>
+                  <a:srgbClr val="FFFF00"/>
+                </a:solidFill>
+              </a:rPr>
+              <a:t>10 Number Guesser</a:t>
+            </a:r>
+            <a:endParaRPr lang="zh-TW" altLang="en-US" b="1" dirty="0">
+              <a:solidFill>
+                <a:srgbClr val="FFFF00"/>
+              </a:solidFill>
+            </a:endParaRPr>
+          </a:p>
+        </p:txBody>
+      </p:sp>
+      <p:sp>
+        <p:nvSpPr>
+          <p:cNvPr id="3" name="副標題 2"/>
+          <p:cNvSpPr>
+            <a:spLocks noGrp="1"/>
+          </p:cNvSpPr>
+          <p:nvPr>
+            <p:ph type="subTitle" idx="1"/>
+          </p:nvPr>
+        </p:nvSpPr>
+        <p:spPr>
+          <a:xfrm>
+            <a:off x="467544" y="1268760"/>
+            <a:ext cx="8136904" cy="1294537"/>
+          </a:xfrm>
+          <a:ln>
+            <a:solidFill>
+              <a:srgbClr val="C00000"/>
+            </a:solidFill>
+          </a:ln>
+        </p:spPr>
+        <p:txBody>
+          <a:bodyPr>
+            <a:noAutofit/>
+          </a:bodyPr>
+          <a:lstStyle/>
+          <a:p>
+            <a:pPr marL="342900" indent="-342900" algn="l">
+              <a:buClr>
+                <a:srgbClr val="0070C0"/>
+              </a:buClr>
+              <a:buSzPct val="80000"/>
+              <a:buFont typeface="Wingdings" pitchFamily="2" charset="2"/>
+              <a:buChar char="u"/>
+            </a:pPr>
+            <a:r>
+              <a:rPr lang="en-US" sz="1800" b="1" dirty="0" err="1">
+                <a:solidFill>
+                  <a:schemeClr val="tx1"/>
+                </a:solidFill>
+              </a:rPr>
+              <a:t>Pygame</a:t>
+            </a:r>
+            <a:r>
+              <a:rPr lang="en-US" sz="1800" b="1" dirty="0">
+                <a:solidFill>
+                  <a:schemeClr val="tx1"/>
+                </a:solidFill>
+              </a:rPr>
+              <a:t> is a cross-platform set of Python modules designed for writing video games. It includes computer graphics and sound libraries designed to be used with the Python programming language.</a:t>
+            </a:r>
+          </a:p>
+          <a:p>
+            <a:pPr marL="342900" indent="-342900" algn="l">
+              <a:buClr>
+                <a:srgbClr val="0070C0"/>
+              </a:buClr>
+              <a:buSzPct val="80000"/>
+              <a:buFont typeface="Wingdings" pitchFamily="2" charset="2"/>
+              <a:buChar char="u"/>
+            </a:pPr>
+            <a:r>
+              <a:rPr lang="en-US" sz="1800" b="1" dirty="0">
+                <a:solidFill>
+                  <a:schemeClr val="tx1"/>
+                </a:solidFill>
+              </a:rPr>
+              <a:t>Start the GUI program</a:t>
+            </a:r>
+          </a:p>
+        </p:txBody>
+      </p:sp>
+      <p:sp>
+        <p:nvSpPr>
+          <p:cNvPr id="4" name="標題 1"/>
+          <p:cNvSpPr txBox="1">
+            <a:spLocks/>
+          </p:cNvSpPr>
+          <p:nvPr/>
+        </p:nvSpPr>
+        <p:spPr>
+          <a:xfrm>
+            <a:off x="0" y="764704"/>
+            <a:ext cx="9144000" cy="360040"/>
+          </a:xfrm>
+          <a:prstGeom prst="rect">
+            <a:avLst/>
+          </a:prstGeom>
+          <a:gradFill flip="none" rotWithShape="1">
+            <a:gsLst>
+              <a:gs pos="0">
+                <a:srgbClr val="00B0F0">
+                  <a:shade val="30000"/>
+                  <a:satMod val="115000"/>
+                </a:srgbClr>
+              </a:gs>
+              <a:gs pos="50000">
+                <a:srgbClr val="00B0F0">
+                  <a:shade val="67500"/>
+                  <a:satMod val="115000"/>
+                </a:srgbClr>
+              </a:gs>
+              <a:gs pos="100000">
+                <a:srgbClr val="00B0F0">
+                  <a:shade val="100000"/>
+                  <a:satMod val="115000"/>
+                </a:srgbClr>
+              </a:gs>
+            </a:gsLst>
+            <a:path path="circle">
+              <a:fillToRect t="100000" r="100000"/>
+            </a:path>
+            <a:tileRect l="-100000" b="-100000"/>
+          </a:gradFill>
+        </p:spPr>
+        <p:txBody>
+          <a:bodyPr vert="horz" lIns="91440" tIns="45720" rIns="91440" bIns="45720" rtlCol="0" anchor="ctr">
+            <a:normAutofit/>
+          </a:bodyPr>
+          <a:lstStyle/>
+          <a:p>
+            <a:pPr lvl="0">
+              <a:spcBef>
+                <a:spcPct val="0"/>
+              </a:spcBef>
+            </a:pPr>
+            <a:r>
+              <a:rPr lang="en-US" altLang="zh-TW" sz="1600" dirty="0">
+                <a:latin typeface="+mj-lt"/>
+                <a:ea typeface="+mj-ea"/>
+                <a:cs typeface="+mj-cs"/>
+              </a:rPr>
+              <a:t>https://www.youtube.com/watch?v=jNW97izstLg&amp;t=10s</a:t>
+            </a:r>
+            <a:endParaRPr kumimoji="0" lang="zh-TW" altLang="en-US" sz="1600" b="0" i="0" u="none" strike="noStrike" kern="1200" cap="none" spc="0" normalizeH="0" baseline="0" noProof="0" dirty="0">
+              <a:ln>
+                <a:noFill/>
+              </a:ln>
+              <a:solidFill>
+                <a:schemeClr val="tx1"/>
+              </a:solidFill>
+              <a:effectLst/>
+              <a:uLnTx/>
+              <a:uFillTx/>
+              <a:latin typeface="+mj-lt"/>
+              <a:ea typeface="+mj-ea"/>
+              <a:cs typeface="+mj-cs"/>
+            </a:endParaRPr>
+          </a:p>
+        </p:txBody>
+      </p:sp>
+      <p:sp>
+        <p:nvSpPr>
+          <p:cNvPr id="5" name="日期版面配置區 4"/>
+          <p:cNvSpPr>
+            <a:spLocks noGrp="1"/>
+          </p:cNvSpPr>
+          <p:nvPr>
+            <p:ph type="dt" sz="half" idx="10"/>
+          </p:nvPr>
+        </p:nvSpPr>
+        <p:spPr/>
+        <p:txBody>
+          <a:bodyPr/>
+          <a:lstStyle/>
+          <a:p>
+            <a:fld id="{A4F910E6-8D00-4BAF-8C48-9688E0B449D3}" type="datetime1">
+              <a:rPr lang="zh-TW" altLang="en-US" smtClean="0"/>
+              <a:pPr/>
+              <a:t>2019/4/6</a:t>
+            </a:fld>
+            <a:endParaRPr lang="zh-TW" altLang="en-US"/>
+          </a:p>
+        </p:txBody>
+      </p:sp>
+      <p:sp>
+        <p:nvSpPr>
+          <p:cNvPr id="6" name="投影片編號版面配置區 5"/>
+          <p:cNvSpPr>
+            <a:spLocks noGrp="1"/>
+          </p:cNvSpPr>
+          <p:nvPr>
+            <p:ph type="sldNum" sz="quarter" idx="12"/>
+          </p:nvPr>
+        </p:nvSpPr>
+        <p:spPr/>
+        <p:txBody>
+          <a:bodyPr/>
+          <a:lstStyle/>
+          <a:p>
+            <a:fld id="{E4D7E63D-91F2-4366-A2C4-1B00C9E2590E}" type="slidenum">
+              <a:rPr lang="zh-TW" altLang="en-US" smtClean="0"/>
+              <a:pPr/>
+              <a:t>17</a:t>
+            </a:fld>
+            <a:endParaRPr lang="zh-TW" altLang="en-US"/>
+          </a:p>
+        </p:txBody>
+      </p:sp>
+      <p:pic>
+        <p:nvPicPr>
+          <p:cNvPr id="7" name="Picture 6">
+            <a:extLst>
+              <a:ext uri="{FF2B5EF4-FFF2-40B4-BE49-F238E27FC236}">
+                <a16:creationId xmlns:a16="http://schemas.microsoft.com/office/drawing/2014/main" id="{8FDB2F7B-5995-4AFC-A20F-51B76EAA28A6}"/>
+              </a:ext>
+            </a:extLst>
+          </p:cNvPr>
+          <p:cNvPicPr>
+            <a:picLocks noChangeAspect="1"/>
+          </p:cNvPicPr>
+          <p:nvPr/>
+        </p:nvPicPr>
+        <p:blipFill>
+          <a:blip r:embed="rId2"/>
+          <a:stretch>
+            <a:fillRect/>
+          </a:stretch>
+        </p:blipFill>
+        <p:spPr>
+          <a:xfrm>
+            <a:off x="457200" y="2638273"/>
+            <a:ext cx="3754760" cy="1757723"/>
+          </a:xfrm>
+          <a:prstGeom prst="rect">
+            <a:avLst/>
+          </a:prstGeom>
+          <a:ln>
+            <a:solidFill>
+              <a:srgbClr val="C00000"/>
+            </a:solidFill>
+          </a:ln>
+        </p:spPr>
+      </p:pic>
+      <p:pic>
+        <p:nvPicPr>
+          <p:cNvPr id="8" name="Picture 7">
+            <a:extLst>
+              <a:ext uri="{FF2B5EF4-FFF2-40B4-BE49-F238E27FC236}">
+                <a16:creationId xmlns:a16="http://schemas.microsoft.com/office/drawing/2014/main" id="{1F20FA25-D463-401D-8D29-4CECD1FA479E}"/>
+              </a:ext>
+            </a:extLst>
+          </p:cNvPr>
+          <p:cNvPicPr>
+            <a:picLocks noChangeAspect="1"/>
+          </p:cNvPicPr>
+          <p:nvPr/>
+        </p:nvPicPr>
+        <p:blipFill>
+          <a:blip r:embed="rId3"/>
+          <a:stretch>
+            <a:fillRect/>
+          </a:stretch>
+        </p:blipFill>
+        <p:spPr>
+          <a:xfrm>
+            <a:off x="4385913" y="2605437"/>
+            <a:ext cx="3891104" cy="3933475"/>
+          </a:xfrm>
+          <a:prstGeom prst="rect">
+            <a:avLst/>
+          </a:prstGeom>
+          <a:ln>
+            <a:solidFill>
+              <a:srgbClr val="C00000"/>
+            </a:solidFill>
+          </a:ln>
+        </p:spPr>
+      </p:pic>
+      <p:sp>
+        <p:nvSpPr>
+          <p:cNvPr id="9" name="Rectangle 8">
+            <a:extLst>
+              <a:ext uri="{FF2B5EF4-FFF2-40B4-BE49-F238E27FC236}">
+                <a16:creationId xmlns:a16="http://schemas.microsoft.com/office/drawing/2014/main" id="{9DF61DD0-E280-442F-A3F8-E368ED7C7EF3}"/>
+              </a:ext>
+            </a:extLst>
+          </p:cNvPr>
+          <p:cNvSpPr/>
+          <p:nvPr/>
+        </p:nvSpPr>
+        <p:spPr>
+          <a:xfrm>
+            <a:off x="827584" y="3573016"/>
+            <a:ext cx="576064" cy="216024"/>
+          </a:xfrm>
+          <a:prstGeom prst="rect">
+            <a:avLst/>
+          </a:prstGeom>
+          <a:noFill/>
+          <a:ln>
+            <a:solidFill>
+              <a:srgbClr val="C00000"/>
+            </a:solidFill>
+          </a:ln>
+        </p:spPr>
+        <p:style>
+          <a:lnRef idx="2">
+            <a:schemeClr val="accent1">
+              <a:shade val="50000"/>
+            </a:schemeClr>
+          </a:lnRef>
+          <a:fillRef idx="1">
+            <a:schemeClr val="accent1"/>
+          </a:fillRef>
+          <a:effectRef idx="0">
+            <a:schemeClr val="accent1"/>
+          </a:effectRef>
+          <a:fontRef idx="minor">
+            <a:schemeClr val="lt1"/>
+          </a:fontRef>
+        </p:style>
+        <p:txBody>
+          <a:bodyPr rtlCol="0" anchor="ctr"/>
+          <a:lstStyle/>
+          <a:p>
+            <a:pPr algn="ctr"/>
+            <a:endParaRPr lang="en-US"/>
+          </a:p>
+        </p:txBody>
+      </p:sp>
+      <p:cxnSp>
+        <p:nvCxnSpPr>
+          <p:cNvPr id="12" name="Straight Arrow Connector 11">
+            <a:extLst>
+              <a:ext uri="{FF2B5EF4-FFF2-40B4-BE49-F238E27FC236}">
+                <a16:creationId xmlns:a16="http://schemas.microsoft.com/office/drawing/2014/main" id="{3BB31ABE-2858-49E3-A8D2-FB3F6FD6E1E0}"/>
+              </a:ext>
+            </a:extLst>
+          </p:cNvPr>
+          <p:cNvCxnSpPr>
+            <a:stCxn id="9" idx="3"/>
+            <a:endCxn id="8" idx="1"/>
+          </p:cNvCxnSpPr>
+          <p:nvPr/>
+        </p:nvCxnSpPr>
+        <p:spPr>
+          <a:xfrm>
+            <a:off x="1403648" y="3681028"/>
+            <a:ext cx="2982265" cy="891147"/>
+          </a:xfrm>
+          <a:prstGeom prst="straightConnector1">
+            <a:avLst/>
+          </a:prstGeom>
+          <a:ln>
+            <a:solidFill>
+              <a:srgbClr val="C00000"/>
+            </a:solidFill>
+            <a:tailEnd type="triangle"/>
+          </a:ln>
+        </p:spPr>
+        <p:style>
+          <a:lnRef idx="1">
+            <a:schemeClr val="accent1"/>
+          </a:lnRef>
+          <a:fillRef idx="0">
+            <a:schemeClr val="accent1"/>
+          </a:fillRef>
+          <a:effectRef idx="0">
+            <a:schemeClr val="accent1"/>
+          </a:effectRef>
+          <a:fontRef idx="minor">
+            <a:schemeClr val="tx1"/>
+          </a:fontRef>
+        </p:style>
+      </p:cxnSp>
+      <p:sp>
+        <p:nvSpPr>
+          <p:cNvPr id="15" name="Rectangle 14">
+            <a:extLst>
+              <a:ext uri="{FF2B5EF4-FFF2-40B4-BE49-F238E27FC236}">
+                <a16:creationId xmlns:a16="http://schemas.microsoft.com/office/drawing/2014/main" id="{4BE9B4CE-CE29-4EC8-93F0-9B696058603A}"/>
+              </a:ext>
+            </a:extLst>
+          </p:cNvPr>
+          <p:cNvSpPr/>
+          <p:nvPr/>
+        </p:nvSpPr>
+        <p:spPr>
+          <a:xfrm>
+            <a:off x="5419514" y="3517944"/>
+            <a:ext cx="1948664" cy="631135"/>
+          </a:xfrm>
+          <a:prstGeom prst="rect">
+            <a:avLst/>
+          </a:prstGeom>
+          <a:noFill/>
+          <a:ln>
+            <a:solidFill>
+              <a:srgbClr val="C00000"/>
+            </a:solidFill>
+          </a:ln>
+        </p:spPr>
+        <p:style>
+          <a:lnRef idx="2">
+            <a:schemeClr val="accent1">
+              <a:shade val="50000"/>
+            </a:schemeClr>
+          </a:lnRef>
+          <a:fillRef idx="1">
+            <a:schemeClr val="accent1"/>
+          </a:fillRef>
+          <a:effectRef idx="0">
+            <a:schemeClr val="accent1"/>
+          </a:effectRef>
+          <a:fontRef idx="minor">
+            <a:schemeClr val="lt1"/>
+          </a:fontRef>
+        </p:style>
+        <p:txBody>
+          <a:bodyPr rtlCol="0" anchor="ctr"/>
+          <a:lstStyle/>
+          <a:p>
+            <a:pPr algn="ctr"/>
+            <a:endParaRPr lang="en-US"/>
+          </a:p>
+        </p:txBody>
+      </p:sp>
+      <p:sp>
+        <p:nvSpPr>
+          <p:cNvPr id="13" name="Rectangle 12">
+            <a:extLst>
+              <a:ext uri="{FF2B5EF4-FFF2-40B4-BE49-F238E27FC236}">
+                <a16:creationId xmlns:a16="http://schemas.microsoft.com/office/drawing/2014/main" id="{47C5A9C3-D7C9-4E0E-8C4F-027F1BE3EE9B}"/>
+              </a:ext>
+            </a:extLst>
+          </p:cNvPr>
+          <p:cNvSpPr/>
+          <p:nvPr/>
+        </p:nvSpPr>
+        <p:spPr>
+          <a:xfrm>
+            <a:off x="7524328" y="3497019"/>
+            <a:ext cx="1512167" cy="797686"/>
+          </a:xfrm>
+          <a:prstGeom prst="rect">
+            <a:avLst/>
+          </a:prstGeom>
+          <a:solidFill>
+            <a:srgbClr val="FFFF00"/>
+          </a:solidFill>
+          <a:ln>
+            <a:solidFill>
+              <a:srgbClr val="C00000"/>
+            </a:solidFill>
+          </a:ln>
+        </p:spPr>
+        <p:style>
+          <a:lnRef idx="2">
+            <a:schemeClr val="accent1">
+              <a:shade val="50000"/>
+            </a:schemeClr>
+          </a:lnRef>
+          <a:fillRef idx="1">
+            <a:schemeClr val="accent1"/>
+          </a:fillRef>
+          <a:effectRef idx="0">
+            <a:schemeClr val="accent1"/>
+          </a:effectRef>
+          <a:fontRef idx="minor">
+            <a:schemeClr val="lt1"/>
+          </a:fontRef>
+        </p:style>
+        <p:txBody>
+          <a:bodyPr rtlCol="0" anchor="ctr"/>
+          <a:lstStyle/>
+          <a:p>
+            <a:r>
+              <a:rPr lang="en-US" dirty="0">
+                <a:solidFill>
+                  <a:schemeClr val="tx1"/>
+                </a:solidFill>
+              </a:rPr>
+              <a:t>Guess the input drawing Number</a:t>
+            </a:r>
+          </a:p>
+        </p:txBody>
+      </p:sp>
+    </p:spTree>
+  </p:cSld>
+  <p:clrMapOvr>
+    <a:masterClrMapping/>
+  </p:clrMapOvr>
+</p:sld>
+</file>
+
+<file path=ppt/slides/slide18.xml><?xml version="1.0" encoding="utf-8"?>
+<p:sld xmlns:a="http://schemas.openxmlformats.org/drawingml/2006/main" xmlns:r="http://schemas.openxmlformats.org/officeDocument/2006/relationships" xmlns:p="http://schemas.openxmlformats.org/presentationml/2006/main">
+  <p:cSld>
+    <p:spTree>
+      <p:nvGrpSpPr>
+        <p:cNvPr id="1" name=""/>
+        <p:cNvGrpSpPr/>
+        <p:nvPr/>
+      </p:nvGrpSpPr>
+      <p:grpSpPr>
+        <a:xfrm>
+          <a:off x="0" y="0"/>
+          <a:ext cx="0" cy="0"/>
+          <a:chOff x="0" y="0"/>
+          <a:chExt cx="0" cy="0"/>
+        </a:xfrm>
+      </p:grpSpPr>
+      <p:pic>
+        <p:nvPicPr>
+          <p:cNvPr id="14" name="Picture 13">
+            <a:extLst>
+              <a:ext uri="{FF2B5EF4-FFF2-40B4-BE49-F238E27FC236}">
+                <a16:creationId xmlns:a16="http://schemas.microsoft.com/office/drawing/2014/main" id="{B948117A-12E6-4F9F-A1B2-966F0E9D1F7F}"/>
+              </a:ext>
+            </a:extLst>
+          </p:cNvPr>
+          <p:cNvPicPr>
+            <a:picLocks noChangeAspect="1"/>
+          </p:cNvPicPr>
+          <p:nvPr/>
+        </p:nvPicPr>
+        <p:blipFill>
+          <a:blip r:embed="rId2"/>
+          <a:stretch>
+            <a:fillRect/>
+          </a:stretch>
+        </p:blipFill>
+        <p:spPr>
+          <a:xfrm>
+            <a:off x="479399" y="1821231"/>
+            <a:ext cx="3157563" cy="3191946"/>
+          </a:xfrm>
+          <a:prstGeom prst="rect">
+            <a:avLst/>
+          </a:prstGeom>
+          <a:ln>
+            <a:solidFill>
+              <a:srgbClr val="C00000"/>
+            </a:solidFill>
+          </a:ln>
+        </p:spPr>
+      </p:pic>
+      <p:pic>
+        <p:nvPicPr>
+          <p:cNvPr id="10" name="Picture 9">
+            <a:extLst>
+              <a:ext uri="{FF2B5EF4-FFF2-40B4-BE49-F238E27FC236}">
+                <a16:creationId xmlns:a16="http://schemas.microsoft.com/office/drawing/2014/main" id="{4216F16A-D6F6-4FAC-ABD7-61DB3F3C4A97}"/>
+              </a:ext>
+            </a:extLst>
+          </p:cNvPr>
+          <p:cNvPicPr>
+            <a:picLocks noChangeAspect="1"/>
+          </p:cNvPicPr>
+          <p:nvPr/>
+        </p:nvPicPr>
+        <p:blipFill>
+          <a:blip r:embed="rId3"/>
+          <a:stretch>
+            <a:fillRect/>
+          </a:stretch>
+        </p:blipFill>
+        <p:spPr>
+          <a:xfrm>
+            <a:off x="3679246" y="2154957"/>
+            <a:ext cx="5431447" cy="2354163"/>
+          </a:xfrm>
+          <a:prstGeom prst="rect">
+            <a:avLst/>
+          </a:prstGeom>
+          <a:ln>
+            <a:solidFill>
+              <a:srgbClr val="C00000"/>
+            </a:solidFill>
+          </a:ln>
+        </p:spPr>
+      </p:pic>
+      <p:sp>
+        <p:nvSpPr>
+          <p:cNvPr id="2" name="標題 1"/>
+          <p:cNvSpPr>
+            <a:spLocks noGrp="1"/>
+          </p:cNvSpPr>
+          <p:nvPr>
+            <p:ph type="ctrTitle"/>
+          </p:nvPr>
+        </p:nvSpPr>
+        <p:spPr>
+          <a:xfrm>
+            <a:off x="0" y="1"/>
+            <a:ext cx="9144000" cy="764704"/>
+          </a:xfrm>
+          <a:gradFill flip="none" rotWithShape="1">
+            <a:gsLst>
+              <a:gs pos="0">
+                <a:srgbClr val="C00000">
+                  <a:shade val="30000"/>
+                  <a:satMod val="115000"/>
+                </a:srgbClr>
+              </a:gs>
+              <a:gs pos="50000">
+                <a:srgbClr val="C00000">
+                  <a:shade val="67500"/>
+                  <a:satMod val="115000"/>
+                </a:srgbClr>
+              </a:gs>
+              <a:gs pos="100000">
+                <a:srgbClr val="C00000">
+                  <a:shade val="100000"/>
+                  <a:satMod val="115000"/>
+                </a:srgbClr>
+              </a:gs>
+            </a:gsLst>
+            <a:path path="circle">
+              <a:fillToRect t="100000" r="100000"/>
+            </a:path>
+            <a:tileRect l="-100000" b="-100000"/>
+          </a:gradFill>
+        </p:spPr>
+        <p:txBody>
+          <a:bodyPr>
+            <a:normAutofit/>
+          </a:bodyPr>
+          <a:lstStyle/>
+          <a:p>
+            <a:pPr algn="l"/>
+            <a:r>
+              <a:rPr lang="en-US" altLang="zh-TW" b="1" dirty="0">
+                <a:solidFill>
+                  <a:srgbClr val="FFFF00"/>
+                </a:solidFill>
+              </a:rPr>
+              <a:t>10 Number Guesser</a:t>
+            </a:r>
+            <a:endParaRPr lang="zh-TW" altLang="en-US" b="1" dirty="0">
+              <a:solidFill>
+                <a:srgbClr val="FFFF00"/>
+              </a:solidFill>
+            </a:endParaRPr>
+          </a:p>
+        </p:txBody>
+      </p:sp>
+      <p:sp>
+        <p:nvSpPr>
+          <p:cNvPr id="3" name="副標題 2"/>
+          <p:cNvSpPr>
+            <a:spLocks noGrp="1"/>
+          </p:cNvSpPr>
+          <p:nvPr>
+            <p:ph type="subTitle" idx="1"/>
+          </p:nvPr>
+        </p:nvSpPr>
+        <p:spPr>
+          <a:xfrm>
+            <a:off x="467544" y="1268761"/>
+            <a:ext cx="8136904" cy="408452"/>
+          </a:xfrm>
+          <a:ln>
+            <a:solidFill>
+              <a:srgbClr val="C00000"/>
+            </a:solidFill>
+          </a:ln>
+        </p:spPr>
+        <p:txBody>
+          <a:bodyPr>
+            <a:noAutofit/>
+          </a:bodyPr>
+          <a:lstStyle/>
+          <a:p>
+            <a:pPr marL="342900" indent="-342900" algn="l">
+              <a:buClr>
+                <a:srgbClr val="0070C0"/>
+              </a:buClr>
+              <a:buSzPct val="80000"/>
+              <a:buFont typeface="Wingdings" pitchFamily="2" charset="2"/>
+              <a:buChar char="u"/>
+            </a:pPr>
+            <a:r>
+              <a:rPr lang="en-US" sz="1800" b="1" dirty="0">
+                <a:solidFill>
+                  <a:schemeClr val="tx1"/>
+                </a:solidFill>
+              </a:rPr>
+              <a:t>Start the Guessing of the drawing Number</a:t>
+            </a:r>
+          </a:p>
+        </p:txBody>
+      </p:sp>
+      <p:sp>
+        <p:nvSpPr>
+          <p:cNvPr id="4" name="標題 1"/>
+          <p:cNvSpPr txBox="1">
+            <a:spLocks/>
+          </p:cNvSpPr>
+          <p:nvPr/>
+        </p:nvSpPr>
+        <p:spPr>
+          <a:xfrm>
+            <a:off x="0" y="764704"/>
+            <a:ext cx="9144000" cy="360040"/>
+          </a:xfrm>
+          <a:prstGeom prst="rect">
+            <a:avLst/>
+          </a:prstGeom>
+          <a:gradFill flip="none" rotWithShape="1">
+            <a:gsLst>
+              <a:gs pos="0">
+                <a:srgbClr val="00B0F0">
+                  <a:shade val="30000"/>
+                  <a:satMod val="115000"/>
+                </a:srgbClr>
+              </a:gs>
+              <a:gs pos="50000">
+                <a:srgbClr val="00B0F0">
+                  <a:shade val="67500"/>
+                  <a:satMod val="115000"/>
+                </a:srgbClr>
+              </a:gs>
+              <a:gs pos="100000">
+                <a:srgbClr val="00B0F0">
+                  <a:shade val="100000"/>
+                  <a:satMod val="115000"/>
+                </a:srgbClr>
+              </a:gs>
+            </a:gsLst>
+            <a:path path="circle">
+              <a:fillToRect t="100000" r="100000"/>
+            </a:path>
+            <a:tileRect l="-100000" b="-100000"/>
+          </a:gradFill>
+        </p:spPr>
+        <p:txBody>
+          <a:bodyPr vert="horz" lIns="91440" tIns="45720" rIns="91440" bIns="45720" rtlCol="0" anchor="ctr">
+            <a:normAutofit/>
+          </a:bodyPr>
+          <a:lstStyle/>
+          <a:p>
+            <a:pPr lvl="0">
+              <a:spcBef>
+                <a:spcPct val="0"/>
+              </a:spcBef>
+            </a:pPr>
+            <a:r>
+              <a:rPr lang="en-US" altLang="zh-TW" sz="1600" dirty="0">
+                <a:latin typeface="+mj-lt"/>
+                <a:ea typeface="+mj-ea"/>
+                <a:cs typeface="+mj-cs"/>
+              </a:rPr>
+              <a:t>https://www.youtube.com/watch?v=jNW97izstLg&amp;t=10s</a:t>
+            </a:r>
+            <a:endParaRPr kumimoji="0" lang="zh-TW" altLang="en-US" sz="1600" b="0" i="0" u="none" strike="noStrike" kern="1200" cap="none" spc="0" normalizeH="0" baseline="0" noProof="0" dirty="0">
+              <a:ln>
+                <a:noFill/>
+              </a:ln>
+              <a:solidFill>
+                <a:schemeClr val="tx1"/>
+              </a:solidFill>
+              <a:effectLst/>
+              <a:uLnTx/>
+              <a:uFillTx/>
+              <a:latin typeface="+mj-lt"/>
+              <a:ea typeface="+mj-ea"/>
+              <a:cs typeface="+mj-cs"/>
+            </a:endParaRPr>
+          </a:p>
+        </p:txBody>
+      </p:sp>
+      <p:sp>
+        <p:nvSpPr>
+          <p:cNvPr id="5" name="日期版面配置區 4"/>
+          <p:cNvSpPr>
+            <a:spLocks noGrp="1"/>
+          </p:cNvSpPr>
+          <p:nvPr>
+            <p:ph type="dt" sz="half" idx="10"/>
+          </p:nvPr>
+        </p:nvSpPr>
+        <p:spPr>
+          <a:xfrm>
+            <a:off x="348969" y="5483654"/>
+            <a:ext cx="2133600" cy="365125"/>
+          </a:xfrm>
+        </p:spPr>
+        <p:txBody>
+          <a:bodyPr/>
+          <a:lstStyle/>
+          <a:p>
+            <a:fld id="{A4F910E6-8D00-4BAF-8C48-9688E0B449D3}" type="datetime1">
+              <a:rPr lang="zh-TW" altLang="en-US" smtClean="0"/>
+              <a:pPr/>
+              <a:t>2019/4/6</a:t>
+            </a:fld>
+            <a:endParaRPr lang="zh-TW" altLang="en-US"/>
+          </a:p>
+        </p:txBody>
+      </p:sp>
+      <p:sp>
+        <p:nvSpPr>
+          <p:cNvPr id="6" name="投影片編號版面配置區 5"/>
+          <p:cNvSpPr>
+            <a:spLocks noGrp="1"/>
+          </p:cNvSpPr>
+          <p:nvPr>
+            <p:ph type="sldNum" sz="quarter" idx="12"/>
+          </p:nvPr>
+        </p:nvSpPr>
+        <p:spPr/>
+        <p:txBody>
+          <a:bodyPr/>
+          <a:lstStyle/>
+          <a:p>
+            <a:fld id="{E4D7E63D-91F2-4366-A2C4-1B00C9E2590E}" type="slidenum">
+              <a:rPr lang="zh-TW" altLang="en-US" smtClean="0"/>
+              <a:pPr/>
+              <a:t>18</a:t>
+            </a:fld>
+            <a:endParaRPr lang="zh-TW" altLang="en-US"/>
+          </a:p>
+        </p:txBody>
+      </p:sp>
+      <p:cxnSp>
+        <p:nvCxnSpPr>
+          <p:cNvPr id="12" name="Straight Arrow Connector 11">
+            <a:extLst>
+              <a:ext uri="{FF2B5EF4-FFF2-40B4-BE49-F238E27FC236}">
+                <a16:creationId xmlns:a16="http://schemas.microsoft.com/office/drawing/2014/main" id="{3BB31ABE-2858-49E3-A8D2-FB3F6FD6E1E0}"/>
+              </a:ext>
+            </a:extLst>
+          </p:cNvPr>
+          <p:cNvCxnSpPr>
+            <a:cxnSpLocks/>
+            <a:stCxn id="16" idx="3"/>
+            <a:endCxn id="10" idx="1"/>
+          </p:cNvCxnSpPr>
+          <p:nvPr/>
+        </p:nvCxnSpPr>
+        <p:spPr>
+          <a:xfrm>
+            <a:off x="2482569" y="2888940"/>
+            <a:ext cx="1196677" cy="443099"/>
+          </a:xfrm>
+          <a:prstGeom prst="straightConnector1">
+            <a:avLst/>
+          </a:prstGeom>
+          <a:ln>
+            <a:solidFill>
+              <a:srgbClr val="C00000"/>
+            </a:solidFill>
+            <a:tailEnd type="triangle"/>
+          </a:ln>
+        </p:spPr>
+        <p:style>
+          <a:lnRef idx="1">
+            <a:schemeClr val="accent1"/>
+          </a:lnRef>
+          <a:fillRef idx="0">
+            <a:schemeClr val="accent1"/>
+          </a:fillRef>
+          <a:effectRef idx="0">
+            <a:schemeClr val="accent1"/>
+          </a:effectRef>
+          <a:fontRef idx="minor">
+            <a:schemeClr val="tx1"/>
+          </a:fontRef>
+        </p:style>
+      </p:cxnSp>
+      <p:sp>
+        <p:nvSpPr>
+          <p:cNvPr id="15" name="Rectangle 14">
+            <a:extLst>
+              <a:ext uri="{FF2B5EF4-FFF2-40B4-BE49-F238E27FC236}">
+                <a16:creationId xmlns:a16="http://schemas.microsoft.com/office/drawing/2014/main" id="{4BE9B4CE-CE29-4EC8-93F0-9B696058603A}"/>
+              </a:ext>
+            </a:extLst>
+          </p:cNvPr>
+          <p:cNvSpPr/>
+          <p:nvPr/>
+        </p:nvSpPr>
+        <p:spPr>
+          <a:xfrm>
+            <a:off x="4351794" y="2611934"/>
+            <a:ext cx="2092414" cy="213376"/>
+          </a:xfrm>
+          <a:prstGeom prst="rect">
+            <a:avLst/>
+          </a:prstGeom>
+          <a:noFill/>
+          <a:ln>
+            <a:solidFill>
+              <a:srgbClr val="C00000"/>
+            </a:solidFill>
+          </a:ln>
+        </p:spPr>
+        <p:style>
+          <a:lnRef idx="2">
+            <a:schemeClr val="accent1">
+              <a:shade val="50000"/>
+            </a:schemeClr>
+          </a:lnRef>
+          <a:fillRef idx="1">
+            <a:schemeClr val="accent1"/>
+          </a:fillRef>
+          <a:effectRef idx="0">
+            <a:schemeClr val="accent1"/>
+          </a:effectRef>
+          <a:fontRef idx="minor">
+            <a:schemeClr val="lt1"/>
+          </a:fontRef>
+        </p:style>
+        <p:txBody>
+          <a:bodyPr rtlCol="0" anchor="ctr"/>
+          <a:lstStyle/>
+          <a:p>
+            <a:pPr algn="ctr"/>
+            <a:endParaRPr lang="en-US"/>
+          </a:p>
+        </p:txBody>
+      </p:sp>
+      <p:sp>
+        <p:nvSpPr>
+          <p:cNvPr id="13" name="Rectangle 12">
+            <a:extLst>
+              <a:ext uri="{FF2B5EF4-FFF2-40B4-BE49-F238E27FC236}">
+                <a16:creationId xmlns:a16="http://schemas.microsoft.com/office/drawing/2014/main" id="{47C5A9C3-D7C9-4E0E-8C4F-027F1BE3EE9B}"/>
+              </a:ext>
+            </a:extLst>
+          </p:cNvPr>
+          <p:cNvSpPr/>
+          <p:nvPr/>
+        </p:nvSpPr>
+        <p:spPr>
+          <a:xfrm>
+            <a:off x="6553200" y="2346833"/>
+            <a:ext cx="2421968" cy="443100"/>
+          </a:xfrm>
+          <a:prstGeom prst="rect">
+            <a:avLst/>
+          </a:prstGeom>
+          <a:solidFill>
+            <a:srgbClr val="FFFF00"/>
+          </a:solidFill>
+          <a:ln>
+            <a:solidFill>
+              <a:srgbClr val="C00000"/>
+            </a:solidFill>
+          </a:ln>
+        </p:spPr>
+        <p:style>
+          <a:lnRef idx="2">
+            <a:schemeClr val="accent1">
+              <a:shade val="50000"/>
+            </a:schemeClr>
+          </a:lnRef>
+          <a:fillRef idx="1">
+            <a:schemeClr val="accent1"/>
+          </a:fillRef>
+          <a:effectRef idx="0">
+            <a:schemeClr val="accent1"/>
+          </a:effectRef>
+          <a:fontRef idx="minor">
+            <a:schemeClr val="lt1"/>
+          </a:fontRef>
+        </p:style>
+        <p:txBody>
+          <a:bodyPr rtlCol="0" anchor="ctr"/>
+          <a:lstStyle/>
+          <a:p>
+            <a:r>
+              <a:rPr lang="en-US" dirty="0">
+                <a:solidFill>
+                  <a:schemeClr val="tx1"/>
+                </a:solidFill>
+              </a:rPr>
+              <a:t>Get the prediction array</a:t>
+            </a:r>
+          </a:p>
+        </p:txBody>
+      </p:sp>
+      <p:sp>
+        <p:nvSpPr>
+          <p:cNvPr id="16" name="Rectangle 15">
+            <a:extLst>
+              <a:ext uri="{FF2B5EF4-FFF2-40B4-BE49-F238E27FC236}">
+                <a16:creationId xmlns:a16="http://schemas.microsoft.com/office/drawing/2014/main" id="{927EB059-503C-4CAD-9C34-9857E6C97087}"/>
+              </a:ext>
+            </a:extLst>
+          </p:cNvPr>
+          <p:cNvSpPr/>
+          <p:nvPr/>
+        </p:nvSpPr>
+        <p:spPr>
+          <a:xfrm>
+            <a:off x="1194231" y="2780927"/>
+            <a:ext cx="1288338" cy="216025"/>
+          </a:xfrm>
+          <a:prstGeom prst="rect">
+            <a:avLst/>
+          </a:prstGeom>
+          <a:noFill/>
+          <a:ln>
+            <a:solidFill>
+              <a:srgbClr val="C00000"/>
+            </a:solidFill>
+          </a:ln>
+        </p:spPr>
+        <p:style>
+          <a:lnRef idx="2">
+            <a:schemeClr val="accent1">
+              <a:shade val="50000"/>
+            </a:schemeClr>
+          </a:lnRef>
+          <a:fillRef idx="1">
+            <a:schemeClr val="accent1"/>
+          </a:fillRef>
+          <a:effectRef idx="0">
+            <a:schemeClr val="accent1"/>
+          </a:effectRef>
+          <a:fontRef idx="minor">
+            <a:schemeClr val="lt1"/>
+          </a:fontRef>
+        </p:style>
+        <p:txBody>
+          <a:bodyPr rtlCol="0" anchor="ctr"/>
+          <a:lstStyle/>
+          <a:p>
+            <a:pPr algn="ctr"/>
+            <a:endParaRPr lang="en-US"/>
+          </a:p>
+        </p:txBody>
+      </p:sp>
+      <p:sp>
+        <p:nvSpPr>
+          <p:cNvPr id="17" name="Rectangle 16">
+            <a:extLst>
+              <a:ext uri="{FF2B5EF4-FFF2-40B4-BE49-F238E27FC236}">
+                <a16:creationId xmlns:a16="http://schemas.microsoft.com/office/drawing/2014/main" id="{0345CD1D-E010-46FC-9043-56C99352DC00}"/>
+              </a:ext>
+            </a:extLst>
+          </p:cNvPr>
+          <p:cNvSpPr/>
+          <p:nvPr/>
+        </p:nvSpPr>
+        <p:spPr>
+          <a:xfrm>
+            <a:off x="1197679" y="3274996"/>
+            <a:ext cx="1512167" cy="797686"/>
+          </a:xfrm>
+          <a:prstGeom prst="rect">
+            <a:avLst/>
+          </a:prstGeom>
+          <a:solidFill>
+            <a:srgbClr val="FFFF00"/>
+          </a:solidFill>
+          <a:ln>
+            <a:solidFill>
+              <a:srgbClr val="C00000"/>
+            </a:solidFill>
+          </a:ln>
+        </p:spPr>
+        <p:style>
+          <a:lnRef idx="2">
+            <a:schemeClr val="accent1">
+              <a:shade val="50000"/>
+            </a:schemeClr>
+          </a:lnRef>
+          <a:fillRef idx="1">
+            <a:schemeClr val="accent1"/>
+          </a:fillRef>
+          <a:effectRef idx="0">
+            <a:schemeClr val="accent1"/>
+          </a:effectRef>
+          <a:fontRef idx="minor">
+            <a:schemeClr val="lt1"/>
+          </a:fontRef>
+        </p:style>
+        <p:txBody>
+          <a:bodyPr rtlCol="0" anchor="ctr"/>
+          <a:lstStyle/>
+          <a:p>
+            <a:r>
+              <a:rPr lang="en-US" dirty="0">
+                <a:solidFill>
+                  <a:schemeClr val="tx1"/>
+                </a:solidFill>
+              </a:rPr>
+              <a:t>Guess the input drawing Number</a:t>
+            </a:r>
+          </a:p>
+        </p:txBody>
+      </p:sp>
+      <p:sp>
+        <p:nvSpPr>
+          <p:cNvPr id="23" name="Rectangle 22">
+            <a:extLst>
+              <a:ext uri="{FF2B5EF4-FFF2-40B4-BE49-F238E27FC236}">
+                <a16:creationId xmlns:a16="http://schemas.microsoft.com/office/drawing/2014/main" id="{F443256D-73D9-4EE6-9E0D-4A67EA298424}"/>
+              </a:ext>
+            </a:extLst>
+          </p:cNvPr>
+          <p:cNvSpPr/>
+          <p:nvPr/>
+        </p:nvSpPr>
+        <p:spPr>
+          <a:xfrm>
+            <a:off x="6486492" y="4370987"/>
+            <a:ext cx="2421968" cy="1792506"/>
+          </a:xfrm>
+          <a:prstGeom prst="rect">
+            <a:avLst/>
+          </a:prstGeom>
+          <a:solidFill>
+            <a:srgbClr val="FFFF00"/>
+          </a:solidFill>
+          <a:ln>
+            <a:solidFill>
+              <a:srgbClr val="C00000"/>
+            </a:solidFill>
+          </a:ln>
+        </p:spPr>
+        <p:style>
+          <a:lnRef idx="2">
+            <a:schemeClr val="accent1">
+              <a:shade val="50000"/>
+            </a:schemeClr>
+          </a:lnRef>
+          <a:fillRef idx="1">
+            <a:schemeClr val="accent1"/>
+          </a:fillRef>
+          <a:effectRef idx="0">
+            <a:schemeClr val="accent1"/>
+          </a:effectRef>
+          <a:fontRef idx="minor">
+            <a:schemeClr val="lt1"/>
+          </a:fontRef>
+        </p:style>
+        <p:txBody>
+          <a:bodyPr rtlCol="0" anchor="ctr"/>
+          <a:lstStyle/>
+          <a:p>
+            <a:r>
+              <a:rPr lang="en-US" dirty="0">
+                <a:solidFill>
+                  <a:schemeClr val="tx1"/>
+                </a:solidFill>
+              </a:rPr>
+              <a:t>Use argmax to find the maximum possibility index. Index = 2 in the above case. The corresponding number for index 2 is digit ‘2’</a:t>
+            </a:r>
+          </a:p>
+        </p:txBody>
+      </p:sp>
+      <p:sp>
+        <p:nvSpPr>
+          <p:cNvPr id="24" name="Rectangle 23">
+            <a:extLst>
+              <a:ext uri="{FF2B5EF4-FFF2-40B4-BE49-F238E27FC236}">
+                <a16:creationId xmlns:a16="http://schemas.microsoft.com/office/drawing/2014/main" id="{B46A0F6F-88DF-46EA-AD15-3E6AA369469E}"/>
+              </a:ext>
+            </a:extLst>
+          </p:cNvPr>
+          <p:cNvSpPr/>
+          <p:nvPr/>
+        </p:nvSpPr>
+        <p:spPr>
+          <a:xfrm>
+            <a:off x="4351794" y="3403275"/>
+            <a:ext cx="2092414" cy="213376"/>
+          </a:xfrm>
+          <a:prstGeom prst="rect">
+            <a:avLst/>
+          </a:prstGeom>
+          <a:noFill/>
+          <a:ln>
+            <a:solidFill>
+              <a:srgbClr val="C00000"/>
+            </a:solidFill>
+          </a:ln>
+        </p:spPr>
+        <p:style>
+          <a:lnRef idx="2">
+            <a:schemeClr val="accent1">
+              <a:shade val="50000"/>
+            </a:schemeClr>
+          </a:lnRef>
+          <a:fillRef idx="1">
+            <a:schemeClr val="accent1"/>
+          </a:fillRef>
+          <a:effectRef idx="0">
+            <a:schemeClr val="accent1"/>
+          </a:effectRef>
+          <a:fontRef idx="minor">
+            <a:schemeClr val="lt1"/>
+          </a:fontRef>
+        </p:style>
+        <p:txBody>
+          <a:bodyPr rtlCol="0" anchor="ctr"/>
+          <a:lstStyle/>
+          <a:p>
+            <a:pPr algn="ctr"/>
+            <a:endParaRPr lang="en-US"/>
+          </a:p>
+        </p:txBody>
+      </p:sp>
+      <p:sp>
+        <p:nvSpPr>
+          <p:cNvPr id="25" name="Rectangle 24">
+            <a:extLst>
+              <a:ext uri="{FF2B5EF4-FFF2-40B4-BE49-F238E27FC236}">
+                <a16:creationId xmlns:a16="http://schemas.microsoft.com/office/drawing/2014/main" id="{2FAC7B9F-5B09-41AD-B63C-45F6BC002901}"/>
+              </a:ext>
+            </a:extLst>
+          </p:cNvPr>
+          <p:cNvSpPr/>
+          <p:nvPr/>
+        </p:nvSpPr>
+        <p:spPr>
+          <a:xfrm>
+            <a:off x="6394969" y="2913077"/>
+            <a:ext cx="913335" cy="213376"/>
+          </a:xfrm>
+          <a:prstGeom prst="rect">
+            <a:avLst/>
+          </a:prstGeom>
+          <a:noFill/>
+          <a:ln>
+            <a:solidFill>
+              <a:srgbClr val="C00000"/>
+            </a:solidFill>
+          </a:ln>
+        </p:spPr>
+        <p:style>
+          <a:lnRef idx="2">
+            <a:schemeClr val="accent1">
+              <a:shade val="50000"/>
+            </a:schemeClr>
+          </a:lnRef>
+          <a:fillRef idx="1">
+            <a:schemeClr val="accent1"/>
+          </a:fillRef>
+          <a:effectRef idx="0">
+            <a:schemeClr val="accent1"/>
+          </a:effectRef>
+          <a:fontRef idx="minor">
+            <a:schemeClr val="lt1"/>
+          </a:fontRef>
+        </p:style>
+        <p:txBody>
+          <a:bodyPr rtlCol="0" anchor="ctr"/>
+          <a:lstStyle/>
+          <a:p>
+            <a:pPr algn="ctr"/>
+            <a:endParaRPr lang="en-US"/>
+          </a:p>
+        </p:txBody>
+      </p:sp>
+      <p:cxnSp>
+        <p:nvCxnSpPr>
+          <p:cNvPr id="27" name="Straight Arrow Connector 26">
+            <a:extLst>
+              <a:ext uri="{FF2B5EF4-FFF2-40B4-BE49-F238E27FC236}">
+                <a16:creationId xmlns:a16="http://schemas.microsoft.com/office/drawing/2014/main" id="{1B169054-FD7A-4450-AEA4-D50382932572}"/>
+              </a:ext>
+            </a:extLst>
+          </p:cNvPr>
+          <p:cNvCxnSpPr>
+            <a:cxnSpLocks/>
+            <a:stCxn id="24" idx="3"/>
+            <a:endCxn id="23" idx="0"/>
+          </p:cNvCxnSpPr>
+          <p:nvPr/>
+        </p:nvCxnSpPr>
+        <p:spPr>
+          <a:xfrm>
+            <a:off x="6444208" y="3509963"/>
+            <a:ext cx="1253268" cy="861024"/>
+          </a:xfrm>
+          <a:prstGeom prst="straightConnector1">
+            <a:avLst/>
+          </a:prstGeom>
+          <a:ln>
+            <a:solidFill>
+              <a:srgbClr val="C00000"/>
+            </a:solidFill>
+            <a:tailEnd type="triangle"/>
+          </a:ln>
+        </p:spPr>
+        <p:style>
+          <a:lnRef idx="1">
+            <a:schemeClr val="accent1"/>
+          </a:lnRef>
+          <a:fillRef idx="0">
+            <a:schemeClr val="accent1"/>
+          </a:fillRef>
+          <a:effectRef idx="0">
+            <a:schemeClr val="accent1"/>
+          </a:effectRef>
+          <a:fontRef idx="minor">
+            <a:schemeClr val="tx1"/>
+          </a:fontRef>
+        </p:style>
+      </p:cxnSp>
+      <p:cxnSp>
+        <p:nvCxnSpPr>
+          <p:cNvPr id="28" name="Straight Arrow Connector 27">
+            <a:extLst>
+              <a:ext uri="{FF2B5EF4-FFF2-40B4-BE49-F238E27FC236}">
+                <a16:creationId xmlns:a16="http://schemas.microsoft.com/office/drawing/2014/main" id="{100D82AC-686D-47A3-8E6A-D3EBA51A0677}"/>
+              </a:ext>
+            </a:extLst>
+          </p:cNvPr>
+          <p:cNvCxnSpPr>
+            <a:cxnSpLocks/>
+            <a:stCxn id="25" idx="2"/>
+            <a:endCxn id="23" idx="0"/>
+          </p:cNvCxnSpPr>
+          <p:nvPr/>
+        </p:nvCxnSpPr>
+        <p:spPr>
+          <a:xfrm>
+            <a:off x="6851637" y="3126453"/>
+            <a:ext cx="845839" cy="1244534"/>
+          </a:xfrm>
+          <a:prstGeom prst="straightConnector1">
+            <a:avLst/>
+          </a:prstGeom>
+          <a:ln>
+            <a:solidFill>
+              <a:srgbClr val="C00000"/>
+            </a:solidFill>
+            <a:tailEnd type="triangle"/>
+          </a:ln>
+        </p:spPr>
+        <p:style>
+          <a:lnRef idx="1">
+            <a:schemeClr val="accent1"/>
+          </a:lnRef>
+          <a:fillRef idx="0">
+            <a:schemeClr val="accent1"/>
+          </a:fillRef>
+          <a:effectRef idx="0">
+            <a:schemeClr val="accent1"/>
+          </a:effectRef>
+          <a:fontRef idx="minor">
+            <a:schemeClr val="tx1"/>
+          </a:fontRef>
+        </p:style>
+      </p:cxnSp>
+    </p:spTree>
+    <p:extLst>
+      <p:ext uri="{BB962C8B-B14F-4D97-AF65-F5344CB8AC3E}">
+        <p14:creationId xmlns:p14="http://schemas.microsoft.com/office/powerpoint/2010/main" val="1729137266"/>
+      </p:ext>
+    </p:extLst>
+  </p:cSld>
+  <p:clrMapOvr>
+    <a:masterClrMapping/>
+  </p:clrMapOvr>
+</p:sld>
+</file>
+
+<file path=ppt/slides/slide19.xml><?xml version="1.0" encoding="utf-8"?>
 <p:sld xmlns:a="http://schemas.openxmlformats.org/drawingml/2006/main" xmlns:r="http://schemas.openxmlformats.org/officeDocument/2006/relationships" xmlns:p="http://schemas.openxmlformats.org/presentationml/2006/main">
   <p:cSld>
     <p:spTree>
@@ -9206,7 +10645,7 @@
             <a:fld id="{A4F910E6-8D00-4BAF-8C48-9688E0B449D3}" type="datetime1">
               <a:rPr lang="zh-TW" altLang="en-US" smtClean="0"/>
               <a:pPr/>
-              <a:t>2019/4/1</a:t>
+              <a:t>2019/4/6</a:t>
             </a:fld>
             <a:endParaRPr lang="zh-TW" altLang="en-US"/>
           </a:p>
@@ -9230,7 +10669,7 @@
             <a:fld id="{E4D7E63D-91F2-4366-A2C4-1B00C9E2590E}" type="slidenum">
               <a:rPr lang="zh-TW" altLang="en-US" smtClean="0"/>
               <a:pPr/>
-              <a:t>17</a:t>
+              <a:t>19</a:t>
             </a:fld>
             <a:endParaRPr lang="zh-TW" altLang="en-US"/>
           </a:p>
@@ -9335,6 +10774,11 @@
         </p:txBody>
       </p:sp>
     </p:spTree>
+    <p:extLst>
+      <p:ext uri="{BB962C8B-B14F-4D97-AF65-F5344CB8AC3E}">
+        <p14:creationId xmlns:p14="http://schemas.microsoft.com/office/powerpoint/2010/main" val="854410515"/>
+      </p:ext>
+    </p:extLst>
   </p:cSld>
   <p:clrMapOvr>
     <a:masterClrMapping/>
@@ -9342,7 +10786,293 @@
 </p:sld>
 </file>
 
-<file path=ppt/slides/slide18.xml><?xml version="1.0" encoding="utf-8"?>
+<file path=ppt/slides/slide2.xml><?xml version="1.0" encoding="utf-8"?>
+<p:sld xmlns:a="http://schemas.openxmlformats.org/drawingml/2006/main" xmlns:r="http://schemas.openxmlformats.org/officeDocument/2006/relationships" xmlns:p="http://schemas.openxmlformats.org/presentationml/2006/main">
+  <p:cSld>
+    <p:spTree>
+      <p:nvGrpSpPr>
+        <p:cNvPr id="1" name=""/>
+        <p:cNvGrpSpPr/>
+        <p:nvPr/>
+      </p:nvGrpSpPr>
+      <p:grpSpPr>
+        <a:xfrm>
+          <a:off x="0" y="0"/>
+          <a:ext cx="0" cy="0"/>
+          <a:chOff x="0" y="0"/>
+          <a:chExt cx="0" cy="0"/>
+        </a:xfrm>
+      </p:grpSpPr>
+      <p:sp>
+        <p:nvSpPr>
+          <p:cNvPr id="2" name="標題 1"/>
+          <p:cNvSpPr>
+            <a:spLocks noGrp="1"/>
+          </p:cNvSpPr>
+          <p:nvPr>
+            <p:ph type="ctrTitle"/>
+          </p:nvPr>
+        </p:nvSpPr>
+        <p:spPr>
+          <a:xfrm>
+            <a:off x="0" y="1"/>
+            <a:ext cx="9144000" cy="764704"/>
+          </a:xfrm>
+          <a:gradFill flip="none" rotWithShape="1">
+            <a:gsLst>
+              <a:gs pos="0">
+                <a:srgbClr val="C00000">
+                  <a:shade val="30000"/>
+                  <a:satMod val="115000"/>
+                </a:srgbClr>
+              </a:gs>
+              <a:gs pos="50000">
+                <a:srgbClr val="C00000">
+                  <a:shade val="67500"/>
+                  <a:satMod val="115000"/>
+                </a:srgbClr>
+              </a:gs>
+              <a:gs pos="100000">
+                <a:srgbClr val="C00000">
+                  <a:shade val="100000"/>
+                  <a:satMod val="115000"/>
+                </a:srgbClr>
+              </a:gs>
+            </a:gsLst>
+            <a:path path="circle">
+              <a:fillToRect t="100000" r="100000"/>
+            </a:path>
+            <a:tileRect l="-100000" b="-100000"/>
+          </a:gradFill>
+        </p:spPr>
+        <p:txBody>
+          <a:bodyPr>
+            <a:normAutofit/>
+          </a:bodyPr>
+          <a:lstStyle/>
+          <a:p>
+            <a:pPr algn="l"/>
+            <a:r>
+              <a:rPr lang="en-US" altLang="zh-TW" b="1" dirty="0">
+                <a:solidFill>
+                  <a:srgbClr val="FFFF00"/>
+                </a:solidFill>
+              </a:rPr>
+              <a:t>10 Number Guesser</a:t>
+            </a:r>
+            <a:endParaRPr lang="zh-TW" altLang="en-US" b="1" dirty="0">
+              <a:solidFill>
+                <a:srgbClr val="FFFF00"/>
+              </a:solidFill>
+            </a:endParaRPr>
+          </a:p>
+        </p:txBody>
+      </p:sp>
+      <p:sp>
+        <p:nvSpPr>
+          <p:cNvPr id="3" name="副標題 2"/>
+          <p:cNvSpPr>
+            <a:spLocks noGrp="1"/>
+          </p:cNvSpPr>
+          <p:nvPr>
+            <p:ph type="subTitle" idx="1"/>
+          </p:nvPr>
+        </p:nvSpPr>
+        <p:spPr>
+          <a:xfrm>
+            <a:off x="467544" y="1268759"/>
+            <a:ext cx="8352928" cy="936106"/>
+          </a:xfrm>
+          <a:ln>
+            <a:solidFill>
+              <a:srgbClr val="C00000"/>
+            </a:solidFill>
+          </a:ln>
+        </p:spPr>
+        <p:txBody>
+          <a:bodyPr>
+            <a:noAutofit/>
+          </a:bodyPr>
+          <a:lstStyle/>
+          <a:p>
+            <a:pPr marL="342900" indent="-342900" algn="l">
+              <a:buClr>
+                <a:srgbClr val="0070C0"/>
+              </a:buClr>
+              <a:buSzPct val="80000"/>
+              <a:buFont typeface="Wingdings" pitchFamily="2" charset="2"/>
+              <a:buChar char="u"/>
+            </a:pPr>
+            <a:r>
+              <a:rPr lang="en-US" sz="1600" dirty="0">
+                <a:solidFill>
+                  <a:schemeClr val="tx1"/>
+                </a:solidFill>
+              </a:rPr>
+              <a:t>In this project, we create a number guessing program or model whatever you wan to call it.</a:t>
+            </a:r>
+          </a:p>
+          <a:p>
+            <a:pPr marL="342900" indent="-342900" algn="l">
+              <a:buClr>
+                <a:srgbClr val="0070C0"/>
+              </a:buClr>
+              <a:buSzPct val="80000"/>
+              <a:buFont typeface="Wingdings" pitchFamily="2" charset="2"/>
+              <a:buChar char="u"/>
+            </a:pPr>
+            <a:r>
+              <a:rPr lang="en-US" sz="1600" dirty="0">
+                <a:solidFill>
+                  <a:schemeClr val="tx1"/>
+                </a:solidFill>
+              </a:rPr>
+              <a:t>Given a handwritten digit and the program is able to guess what number you write with a fair degree of accuracy.</a:t>
+            </a:r>
+          </a:p>
+        </p:txBody>
+      </p:sp>
+      <p:sp>
+        <p:nvSpPr>
+          <p:cNvPr id="4" name="標題 1"/>
+          <p:cNvSpPr txBox="1">
+            <a:spLocks/>
+          </p:cNvSpPr>
+          <p:nvPr/>
+        </p:nvSpPr>
+        <p:spPr>
+          <a:xfrm>
+            <a:off x="0" y="764704"/>
+            <a:ext cx="9144000" cy="360040"/>
+          </a:xfrm>
+          <a:prstGeom prst="rect">
+            <a:avLst/>
+          </a:prstGeom>
+          <a:gradFill flip="none" rotWithShape="1">
+            <a:gsLst>
+              <a:gs pos="0">
+                <a:srgbClr val="00B0F0">
+                  <a:shade val="30000"/>
+                  <a:satMod val="115000"/>
+                </a:srgbClr>
+              </a:gs>
+              <a:gs pos="50000">
+                <a:srgbClr val="00B0F0">
+                  <a:shade val="67500"/>
+                  <a:satMod val="115000"/>
+                </a:srgbClr>
+              </a:gs>
+              <a:gs pos="100000">
+                <a:srgbClr val="00B0F0">
+                  <a:shade val="100000"/>
+                  <a:satMod val="115000"/>
+                </a:srgbClr>
+              </a:gs>
+            </a:gsLst>
+            <a:path path="circle">
+              <a:fillToRect t="100000" r="100000"/>
+            </a:path>
+            <a:tileRect l="-100000" b="-100000"/>
+          </a:gradFill>
+        </p:spPr>
+        <p:txBody>
+          <a:bodyPr vert="horz" lIns="91440" tIns="45720" rIns="91440" bIns="45720" rtlCol="0" anchor="ctr">
+            <a:normAutofit/>
+          </a:bodyPr>
+          <a:lstStyle/>
+          <a:p>
+            <a:pPr lvl="0">
+              <a:spcBef>
+                <a:spcPct val="0"/>
+              </a:spcBef>
+            </a:pPr>
+            <a:r>
+              <a:rPr lang="en-US" altLang="zh-TW" sz="1600" dirty="0">
+                <a:latin typeface="+mj-lt"/>
+                <a:ea typeface="+mj-ea"/>
+                <a:cs typeface="+mj-cs"/>
+              </a:rPr>
+              <a:t>https://www.youtube.com/watch?v=jNW97izstLg&amp;t=10s</a:t>
+            </a:r>
+            <a:endParaRPr kumimoji="0" lang="zh-TW" altLang="en-US" sz="1600" b="0" i="0" u="none" strike="noStrike" kern="1200" cap="none" spc="0" normalizeH="0" baseline="0" noProof="0" dirty="0">
+              <a:ln>
+                <a:noFill/>
+              </a:ln>
+              <a:solidFill>
+                <a:schemeClr val="tx1"/>
+              </a:solidFill>
+              <a:effectLst/>
+              <a:uLnTx/>
+              <a:uFillTx/>
+              <a:latin typeface="+mj-lt"/>
+              <a:ea typeface="+mj-ea"/>
+              <a:cs typeface="+mj-cs"/>
+            </a:endParaRPr>
+          </a:p>
+        </p:txBody>
+      </p:sp>
+      <p:sp>
+        <p:nvSpPr>
+          <p:cNvPr id="5" name="日期版面配置區 4"/>
+          <p:cNvSpPr>
+            <a:spLocks noGrp="1"/>
+          </p:cNvSpPr>
+          <p:nvPr>
+            <p:ph type="dt" sz="half" idx="10"/>
+          </p:nvPr>
+        </p:nvSpPr>
+        <p:spPr/>
+        <p:txBody>
+          <a:bodyPr/>
+          <a:lstStyle/>
+          <a:p>
+            <a:fld id="{A4F910E6-8D00-4BAF-8C48-9688E0B449D3}" type="datetime1">
+              <a:rPr lang="zh-TW" altLang="en-US" smtClean="0"/>
+              <a:pPr/>
+              <a:t>2019/4/6</a:t>
+            </a:fld>
+            <a:endParaRPr lang="zh-TW" altLang="en-US"/>
+          </a:p>
+        </p:txBody>
+      </p:sp>
+      <p:sp>
+        <p:nvSpPr>
+          <p:cNvPr id="6" name="投影片編號版面配置區 5"/>
+          <p:cNvSpPr>
+            <a:spLocks noGrp="1"/>
+          </p:cNvSpPr>
+          <p:nvPr>
+            <p:ph type="sldNum" sz="quarter" idx="12"/>
+          </p:nvPr>
+        </p:nvSpPr>
+        <p:spPr/>
+        <p:txBody>
+          <a:bodyPr/>
+          <a:lstStyle/>
+          <a:p>
+            <a:fld id="{E4D7E63D-91F2-4366-A2C4-1B00C9E2590E}" type="slidenum">
+              <a:rPr lang="zh-TW" altLang="en-US" smtClean="0"/>
+              <a:pPr/>
+              <a:t>2</a:t>
+            </a:fld>
+            <a:endParaRPr lang="zh-TW" altLang="en-US"/>
+          </a:p>
+        </p:txBody>
+      </p:sp>
+    </p:spTree>
+    <p:extLst>
+      <p:ext uri="{BB962C8B-B14F-4D97-AF65-F5344CB8AC3E}">
+        <p14:creationId xmlns:p14="http://schemas.microsoft.com/office/powerpoint/2010/main" val="1142987230"/>
+      </p:ext>
+    </p:extLst>
+  </p:cSld>
+  <p:clrMapOvr>
+    <a:masterClrMapping/>
+  </p:clrMapOvr>
+</p:sld>
+</file>
+
+<file path=ppt/slides/slide20.xml><?xml version="1.0" encoding="utf-8"?>
 <p:sld xmlns:a="http://schemas.openxmlformats.org/drawingml/2006/main" xmlns:r="http://schemas.openxmlformats.org/officeDocument/2006/relationships" xmlns:p="http://schemas.openxmlformats.org/presentationml/2006/main">
   <p:cSld>
     <p:spTree>
@@ -9655,7 +11385,7 @@
             <a:fld id="{A4F910E6-8D00-4BAF-8C48-9688E0B449D3}" type="datetime1">
               <a:rPr lang="zh-TW" altLang="en-US" smtClean="0"/>
               <a:pPr/>
-              <a:t>2019/4/1</a:t>
+              <a:t>2019/4/6</a:t>
             </a:fld>
             <a:endParaRPr lang="zh-TW" altLang="en-US"/>
           </a:p>
@@ -9679,7 +11409,7 @@
             <a:fld id="{E4D7E63D-91F2-4366-A2C4-1B00C9E2590E}" type="slidenum">
               <a:rPr lang="zh-TW" altLang="en-US" smtClean="0"/>
               <a:pPr/>
-              <a:t>18</a:t>
+              <a:t>20</a:t>
             </a:fld>
             <a:endParaRPr lang="zh-TW" altLang="en-US"/>
           </a:p>
@@ -9842,7 +11572,7 @@
 </p:sld>
 </file>
 
-<file path=ppt/slides/slide19.xml><?xml version="1.0" encoding="utf-8"?>
+<file path=ppt/slides/slide21.xml><?xml version="1.0" encoding="utf-8"?>
 <p:sld xmlns:a="http://schemas.openxmlformats.org/drawingml/2006/main" xmlns:r="http://schemas.openxmlformats.org/officeDocument/2006/relationships" xmlns:p="http://schemas.openxmlformats.org/presentationml/2006/main">
   <p:cSld>
     <p:spTree>
@@ -10155,7 +11885,7 @@
             <a:fld id="{A4F910E6-8D00-4BAF-8C48-9688E0B449D3}" type="datetime1">
               <a:rPr lang="zh-TW" altLang="en-US" smtClean="0"/>
               <a:pPr/>
-              <a:t>2019/4/1</a:t>
+              <a:t>2019/4/6</a:t>
             </a:fld>
             <a:endParaRPr lang="zh-TW" altLang="en-US"/>
           </a:p>
@@ -10179,7 +11909,7 @@
             <a:fld id="{E4D7E63D-91F2-4366-A2C4-1B00C9E2590E}" type="slidenum">
               <a:rPr lang="zh-TW" altLang="en-US" smtClean="0"/>
               <a:pPr/>
-              <a:t>19</a:t>
+              <a:t>21</a:t>
             </a:fld>
             <a:endParaRPr lang="zh-TW" altLang="en-US"/>
           </a:p>
@@ -10377,7 +12107,7 @@
 </p:sld>
 </file>
 
-<file path=ppt/slides/slide2.xml><?xml version="1.0" encoding="utf-8"?>
+<file path=ppt/slides/slide22.xml><?xml version="1.0" encoding="utf-8"?>
 <p:sld xmlns:a="http://schemas.openxmlformats.org/drawingml/2006/main" xmlns:r="http://schemas.openxmlformats.org/officeDocument/2006/relationships" xmlns:p="http://schemas.openxmlformats.org/presentationml/2006/main">
   <p:cSld>
     <p:spTree>
@@ -10449,7 +12179,7 @@
                   <a:srgbClr val="FFFF00"/>
                 </a:solidFill>
               </a:rPr>
-              <a:t>10 Number Guesser</a:t>
+              <a:t>10.3 ch1003_drawNumber.py</a:t>
             </a:r>
             <a:endParaRPr lang="zh-TW" altLang="en-US" b="1" dirty="0">
               <a:solidFill>
@@ -10471,8 +12201,8 @@
         </p:nvSpPr>
         <p:spPr>
           <a:xfrm>
-            <a:off x="467544" y="1268759"/>
-            <a:ext cx="8352928" cy="936106"/>
+            <a:off x="472050" y="1214422"/>
+            <a:ext cx="8276414" cy="360040"/>
           </a:xfrm>
           <a:ln>
             <a:solidFill>
@@ -10500,25 +12230,7 @@
                   <a:schemeClr val="tx1"/>
                 </a:solidFill>
               </a:rPr>
-              <a:t>In this project, we create a number guessing program or model whatever you wan to call it.</a:t>
-            </a:r>
-          </a:p>
-          <a:p>
-            <a:pPr marL="342900" indent="-342900" algn="l">
-              <a:buClr>
-                <a:srgbClr val="0070C0"/>
-              </a:buClr>
-              <a:buSzPct val="80000"/>
-              <a:buFont typeface="Wingdings" pitchFamily="2" charset="2"/>
-              <a:buChar char="u"/>
-            </a:pPr>
-            <a:r>
-              <a:rPr lang="en-US" sz="1600" dirty="0">
-                <a:solidFill>
-                  <a:schemeClr val="tx1"/>
-                </a:solidFill>
-              </a:rPr>
-              <a:t>Given a handwritten digit and the program is able to guess what number you write with a fair degree of accuracy.</a:t>
+              <a:t>This program is not hard code but sometimes get incorrect prediction.</a:t>
             </a:r>
           </a:p>
         </p:txBody>
@@ -10620,7 +12332,7 @@
             <a:fld id="{A4F910E6-8D00-4BAF-8C48-9688E0B449D3}" type="datetime1">
               <a:rPr lang="zh-TW" altLang="en-US" smtClean="0"/>
               <a:pPr/>
-              <a:t>2019/4/1</a:t>
+              <a:t>2019/4/6</a:t>
             </a:fld>
             <a:endParaRPr lang="zh-TW" altLang="en-US"/>
           </a:p>
@@ -10644,7 +12356,7 @@
             <a:fld id="{E4D7E63D-91F2-4366-A2C4-1B00C9E2590E}" type="slidenum">
               <a:rPr lang="zh-TW" altLang="en-US" smtClean="0"/>
               <a:pPr/>
-              <a:t>2</a:t>
+              <a:t>22</a:t>
             </a:fld>
             <a:endParaRPr lang="zh-TW" altLang="en-US"/>
           </a:p>
@@ -10653,7 +12365,7 @@
     </p:spTree>
     <p:extLst>
       <p:ext uri="{BB962C8B-B14F-4D97-AF65-F5344CB8AC3E}">
-        <p14:creationId xmlns:p14="http://schemas.microsoft.com/office/powerpoint/2010/main" val="1142987230"/>
+        <p14:creationId xmlns:p14="http://schemas.microsoft.com/office/powerpoint/2010/main" val="2784249692"/>
       </p:ext>
     </p:extLst>
   </p:cSld>
@@ -10663,7 +12375,186 @@
 </p:sld>
 </file>
 
-<file path=ppt/slides/slide20.xml><?xml version="1.0" encoding="utf-8"?>
+<file path=ppt/slides/slide23.xml><?xml version="1.0" encoding="utf-8"?>
+<p:sld xmlns:a="http://schemas.openxmlformats.org/drawingml/2006/main" xmlns:r="http://schemas.openxmlformats.org/officeDocument/2006/relationships" xmlns:p="http://schemas.openxmlformats.org/presentationml/2006/main">
+  <p:cSld>
+    <p:spTree>
+      <p:nvGrpSpPr>
+        <p:cNvPr id="1" name=""/>
+        <p:cNvGrpSpPr/>
+        <p:nvPr/>
+      </p:nvGrpSpPr>
+      <p:grpSpPr>
+        <a:xfrm>
+          <a:off x="0" y="0"/>
+          <a:ext cx="0" cy="0"/>
+          <a:chOff x="0" y="0"/>
+          <a:chExt cx="0" cy="0"/>
+        </a:xfrm>
+      </p:grpSpPr>
+      <p:sp>
+        <p:nvSpPr>
+          <p:cNvPr id="2" name="標題 1"/>
+          <p:cNvSpPr>
+            <a:spLocks noGrp="1"/>
+          </p:cNvSpPr>
+          <p:nvPr>
+            <p:ph type="ctrTitle"/>
+          </p:nvPr>
+        </p:nvSpPr>
+        <p:spPr>
+          <a:xfrm>
+            <a:off x="0" y="2130425"/>
+            <a:ext cx="9144000" cy="1470025"/>
+          </a:xfrm>
+          <a:solidFill>
+            <a:srgbClr val="00B0F0"/>
+          </a:solidFill>
+        </p:spPr>
+        <p:txBody>
+          <a:bodyPr>
+            <a:normAutofit/>
+          </a:bodyPr>
+          <a:lstStyle/>
+          <a:p>
+            <a:r>
+              <a:rPr lang="en-US" altLang="zh-TW" sz="4800" b="1" dirty="0">
+                <a:solidFill>
+                  <a:srgbClr val="FFFF00"/>
+                </a:solidFill>
+              </a:rPr>
+              <a:t>10.4 ch1004_neuralNetwork.py</a:t>
+            </a:r>
+            <a:endParaRPr lang="zh-TW" altLang="en-US" sz="4800" b="1" dirty="0">
+              <a:solidFill>
+                <a:srgbClr val="FFFF00"/>
+              </a:solidFill>
+            </a:endParaRPr>
+          </a:p>
+        </p:txBody>
+      </p:sp>
+      <p:sp>
+        <p:nvSpPr>
+          <p:cNvPr id="3" name="副標題 2"/>
+          <p:cNvSpPr>
+            <a:spLocks noGrp="1"/>
+          </p:cNvSpPr>
+          <p:nvPr>
+            <p:ph type="subTitle" idx="1"/>
+          </p:nvPr>
+        </p:nvSpPr>
+        <p:spPr>
+          <a:xfrm>
+            <a:off x="1259632" y="4581128"/>
+            <a:ext cx="6400800" cy="694928"/>
+          </a:xfrm>
+        </p:spPr>
+        <p:txBody>
+          <a:bodyPr>
+            <a:normAutofit/>
+          </a:bodyPr>
+          <a:lstStyle/>
+          <a:p>
+            <a:r>
+              <a:rPr lang="en-US" altLang="zh-TW" dirty="0"/>
+              <a:t>Peter H. Chen</a:t>
+            </a:r>
+            <a:endParaRPr lang="zh-TW" altLang="en-US" dirty="0"/>
+          </a:p>
+        </p:txBody>
+      </p:sp>
+      <p:sp>
+        <p:nvSpPr>
+          <p:cNvPr id="5" name="日期版面配置區 4"/>
+          <p:cNvSpPr>
+            <a:spLocks noGrp="1"/>
+          </p:cNvSpPr>
+          <p:nvPr>
+            <p:ph type="dt" sz="half" idx="10"/>
+          </p:nvPr>
+        </p:nvSpPr>
+        <p:spPr/>
+        <p:txBody>
+          <a:bodyPr/>
+          <a:lstStyle/>
+          <a:p>
+            <a:fld id="{C389EDC9-19E3-47AC-9C57-C6A24DEA81AD}" type="datetime1">
+              <a:rPr lang="zh-TW" altLang="en-US" smtClean="0"/>
+              <a:pPr/>
+              <a:t>2019/4/6</a:t>
+            </a:fld>
+            <a:endParaRPr lang="zh-TW" altLang="en-US"/>
+          </a:p>
+        </p:txBody>
+      </p:sp>
+      <p:sp>
+        <p:nvSpPr>
+          <p:cNvPr id="6" name="投影片編號版面配置區 5"/>
+          <p:cNvSpPr>
+            <a:spLocks noGrp="1"/>
+          </p:cNvSpPr>
+          <p:nvPr>
+            <p:ph type="sldNum" sz="quarter" idx="12"/>
+          </p:nvPr>
+        </p:nvSpPr>
+        <p:spPr/>
+        <p:txBody>
+          <a:bodyPr/>
+          <a:lstStyle/>
+          <a:p>
+            <a:fld id="{E4D7E63D-91F2-4366-A2C4-1B00C9E2590E}" type="slidenum">
+              <a:rPr lang="zh-TW" altLang="en-US" smtClean="0"/>
+              <a:pPr/>
+              <a:t>23</a:t>
+            </a:fld>
+            <a:endParaRPr lang="zh-TW" altLang="en-US"/>
+          </a:p>
+        </p:txBody>
+      </p:sp>
+      <p:pic>
+        <p:nvPicPr>
+          <p:cNvPr id="4" name="Picture 3">
+            <a:extLst>
+              <a:ext uri="{FF2B5EF4-FFF2-40B4-BE49-F238E27FC236}">
+                <a16:creationId xmlns:a16="http://schemas.microsoft.com/office/drawing/2014/main" id="{7A4D60E2-93C7-4A51-A7EE-54D2D57FE8B6}"/>
+              </a:ext>
+            </a:extLst>
+          </p:cNvPr>
+          <p:cNvPicPr>
+            <a:picLocks noChangeAspect="1"/>
+          </p:cNvPicPr>
+          <p:nvPr/>
+        </p:nvPicPr>
+        <p:blipFill>
+          <a:blip r:embed="rId2"/>
+          <a:stretch>
+            <a:fillRect/>
+          </a:stretch>
+        </p:blipFill>
+        <p:spPr>
+          <a:xfrm>
+            <a:off x="3851920" y="3717032"/>
+            <a:ext cx="1202568" cy="990350"/>
+          </a:xfrm>
+          <a:prstGeom prst="rect">
+            <a:avLst/>
+          </a:prstGeom>
+        </p:spPr>
+      </p:pic>
+    </p:spTree>
+    <p:extLst>
+      <p:ext uri="{BB962C8B-B14F-4D97-AF65-F5344CB8AC3E}">
+        <p14:creationId xmlns:p14="http://schemas.microsoft.com/office/powerpoint/2010/main" val="1876708517"/>
+      </p:ext>
+    </p:extLst>
+  </p:cSld>
+  <p:clrMapOvr>
+    <a:masterClrMapping/>
+  </p:clrMapOvr>
+</p:sld>
+</file>
+
+<file path=ppt/slides/slide24.xml><?xml version="1.0" encoding="utf-8"?>
 <p:sld xmlns:a="http://schemas.openxmlformats.org/drawingml/2006/main" xmlns:r="http://schemas.openxmlformats.org/officeDocument/2006/relationships" xmlns:p="http://schemas.openxmlformats.org/presentationml/2006/main">
   <p:cSld>
     <p:spTree>
@@ -10735,7 +12626,7 @@
                   <a:srgbClr val="FFFF00"/>
                 </a:solidFill>
               </a:rPr>
-              <a:t>10.3 ch1003_drawNumber.py</a:t>
+              <a:t>10.4 ch1004_nerualNetwork.py</a:t>
             </a:r>
             <a:endParaRPr lang="zh-TW" altLang="en-US" b="1" dirty="0">
               <a:solidFill>
@@ -10758,7 +12649,7 @@
         <p:spPr>
           <a:xfrm>
             <a:off x="472050" y="1214422"/>
-            <a:ext cx="8276414" cy="360040"/>
+            <a:ext cx="6980270" cy="360040"/>
           </a:xfrm>
           <a:ln>
             <a:solidFill>
@@ -10786,7 +12677,7 @@
                   <a:schemeClr val="tx1"/>
                 </a:solidFill>
               </a:rPr>
-              <a:t>This program is not hard code but sometimes get incorrect prediction.</a:t>
+              <a:t>This program uses tensorflow for three layers of neural network</a:t>
             </a:r>
           </a:p>
         </p:txBody>
@@ -10888,7 +12779,7 @@
             <a:fld id="{A4F910E6-8D00-4BAF-8C48-9688E0B449D3}" type="datetime1">
               <a:rPr lang="zh-TW" altLang="en-US" smtClean="0"/>
               <a:pPr/>
-              <a:t>2019/4/1</a:t>
+              <a:t>2019/4/6</a:t>
             </a:fld>
             <a:endParaRPr lang="zh-TW" altLang="en-US"/>
           </a:p>
@@ -10912,16 +12803,86 @@
             <a:fld id="{E4D7E63D-91F2-4366-A2C4-1B00C9E2590E}" type="slidenum">
               <a:rPr lang="zh-TW" altLang="en-US" smtClean="0"/>
               <a:pPr/>
-              <a:t>20</a:t>
+              <a:t>24</a:t>
             </a:fld>
             <a:endParaRPr lang="zh-TW" altLang="en-US"/>
           </a:p>
         </p:txBody>
       </p:sp>
+      <p:pic>
+        <p:nvPicPr>
+          <p:cNvPr id="7" name="Picture 6">
+            <a:extLst>
+              <a:ext uri="{FF2B5EF4-FFF2-40B4-BE49-F238E27FC236}">
+                <a16:creationId xmlns:a16="http://schemas.microsoft.com/office/drawing/2014/main" id="{CCF4C88A-2EDF-49CA-9210-855FA42021A2}"/>
+              </a:ext>
+            </a:extLst>
+          </p:cNvPr>
+          <p:cNvPicPr>
+            <a:picLocks noChangeAspect="1"/>
+          </p:cNvPicPr>
+          <p:nvPr/>
+        </p:nvPicPr>
+        <p:blipFill>
+          <a:blip r:embed="rId2"/>
+          <a:stretch>
+            <a:fillRect/>
+          </a:stretch>
+        </p:blipFill>
+        <p:spPr>
+          <a:xfrm>
+            <a:off x="472050" y="1766791"/>
+            <a:ext cx="4028091" cy="4038473"/>
+          </a:xfrm>
+          <a:prstGeom prst="rect">
+            <a:avLst/>
+          </a:prstGeom>
+          <a:ln>
+            <a:solidFill>
+              <a:srgbClr val="C00000"/>
+            </a:solidFill>
+          </a:ln>
+        </p:spPr>
+      </p:pic>
+      <p:pic>
+        <p:nvPicPr>
+          <p:cNvPr id="8" name="Picture 7">
+            <a:extLst>
+              <a:ext uri="{FF2B5EF4-FFF2-40B4-BE49-F238E27FC236}">
+                <a16:creationId xmlns:a16="http://schemas.microsoft.com/office/drawing/2014/main" id="{AEECAB3D-EE2D-42F3-9B4B-92D131955FE3}"/>
+              </a:ext>
+            </a:extLst>
+          </p:cNvPr>
+          <p:cNvPicPr>
+            <a:picLocks noChangeAspect="1"/>
+          </p:cNvPicPr>
+          <p:nvPr/>
+        </p:nvPicPr>
+        <p:blipFill>
+          <a:blip r:embed="rId3"/>
+          <a:stretch>
+            <a:fillRect/>
+          </a:stretch>
+        </p:blipFill>
+        <p:spPr>
+          <a:xfrm>
+            <a:off x="4572001" y="1807861"/>
+            <a:ext cx="4183758" cy="2557243"/>
+          </a:xfrm>
+          <a:prstGeom prst="rect">
+            <a:avLst/>
+          </a:prstGeom>
+          <a:ln>
+            <a:solidFill>
+              <a:srgbClr val="C00000"/>
+            </a:solidFill>
+          </a:ln>
+        </p:spPr>
+      </p:pic>
     </p:spTree>
     <p:extLst>
       <p:ext uri="{BB962C8B-B14F-4D97-AF65-F5344CB8AC3E}">
-        <p14:creationId xmlns:p14="http://schemas.microsoft.com/office/powerpoint/2010/main" val="2784249692"/>
+        <p14:creationId xmlns:p14="http://schemas.microsoft.com/office/powerpoint/2010/main" val="1954138917"/>
       </p:ext>
     </p:extLst>
   </p:cSld>
@@ -10931,7 +12892,7 @@
 </p:sld>
 </file>
 
-<file path=ppt/slides/slide21.xml><?xml version="1.0" encoding="utf-8"?>
+<file path=ppt/slides/slide25.xml><?xml version="1.0" encoding="utf-8"?>
 <p:sld xmlns:a="http://schemas.openxmlformats.org/drawingml/2006/main" xmlns:r="http://schemas.openxmlformats.org/officeDocument/2006/relationships" xmlns:p="http://schemas.openxmlformats.org/presentationml/2006/main">
   <p:cSld>
     <p:spTree>
@@ -10979,7 +12940,7 @@
                   <a:srgbClr val="FFFF00"/>
                 </a:solidFill>
               </a:rPr>
-              <a:t>10.4 ch1004_neuralNetwork.py</a:t>
+              <a:t>10.5 Summary</a:t>
             </a:r>
             <a:endParaRPr lang="zh-TW" altLang="en-US" sz="4800" b="1" dirty="0">
               <a:solidFill>
@@ -11037,7 +12998,7 @@
             <a:fld id="{C389EDC9-19E3-47AC-9C57-C6A24DEA81AD}" type="datetime1">
               <a:rPr lang="zh-TW" altLang="en-US" smtClean="0"/>
               <a:pPr/>
-              <a:t>2019/4/1</a:t>
+              <a:t>2019/4/6</a:t>
             </a:fld>
             <a:endParaRPr lang="zh-TW" altLang="en-US"/>
           </a:p>
@@ -11061,7 +13022,7 @@
             <a:fld id="{E4D7E63D-91F2-4366-A2C4-1B00C9E2590E}" type="slidenum">
               <a:rPr lang="zh-TW" altLang="en-US" smtClean="0"/>
               <a:pPr/>
-              <a:t>21</a:t>
+              <a:t>25</a:t>
             </a:fld>
             <a:endParaRPr lang="zh-TW" altLang="en-US"/>
           </a:p>
@@ -11100,7 +13061,7 @@
     </p:spTree>
     <p:extLst>
       <p:ext uri="{BB962C8B-B14F-4D97-AF65-F5344CB8AC3E}">
-        <p14:creationId xmlns:p14="http://schemas.microsoft.com/office/powerpoint/2010/main" val="1876708517"/>
+        <p14:creationId xmlns:p14="http://schemas.microsoft.com/office/powerpoint/2010/main" val="1098277510"/>
       </p:ext>
     </p:extLst>
   </p:cSld>
@@ -11110,7 +13071,7 @@
 </p:sld>
 </file>
 
-<file path=ppt/slides/slide22.xml><?xml version="1.0" encoding="utf-8"?>
+<file path=ppt/slides/slide26.xml><?xml version="1.0" encoding="utf-8"?>
 <p:sld xmlns:a="http://schemas.openxmlformats.org/drawingml/2006/main" xmlns:r="http://schemas.openxmlformats.org/officeDocument/2006/relationships" xmlns:p="http://schemas.openxmlformats.org/presentationml/2006/main">
   <p:cSld>
     <p:spTree>
@@ -11205,7 +13166,7 @@
         <p:spPr>
           <a:xfrm>
             <a:off x="472050" y="1214422"/>
-            <a:ext cx="6980270" cy="360040"/>
+            <a:ext cx="6980270" cy="630402"/>
           </a:xfrm>
           <a:ln>
             <a:solidFill>
@@ -11233,7 +13194,23 @@
                   <a:schemeClr val="tx1"/>
                 </a:solidFill>
               </a:rPr>
-              <a:t>This program uses tensorflow for three layers of neural network</a:t>
+              <a:t>This section shows write </a:t>
+            </a:r>
+            <a:r>
+              <a:rPr lang="en-US" sz="1600">
+                <a:solidFill>
+                  <a:schemeClr val="tx1"/>
+                </a:solidFill>
+              </a:rPr>
+              <a:t>model data, digit </a:t>
+            </a:r>
+            <a:r>
+              <a:rPr lang="en-US" sz="1600" dirty="0">
+                <a:solidFill>
+                  <a:schemeClr val="tx1"/>
+                </a:solidFill>
+              </a:rPr>
+              <a:t>predict, hand writing prediction, and tensorflow neural network.</a:t>
             </a:r>
           </a:p>
         </p:txBody>
@@ -11335,7 +13312,7 @@
             <a:fld id="{A4F910E6-8D00-4BAF-8C48-9688E0B449D3}" type="datetime1">
               <a:rPr lang="zh-TW" altLang="en-US" smtClean="0"/>
               <a:pPr/>
-              <a:t>2019/4/1</a:t>
+              <a:t>2019/4/6</a:t>
             </a:fld>
             <a:endParaRPr lang="zh-TW" altLang="en-US"/>
           </a:p>
@@ -11359,86 +13336,16 @@
             <a:fld id="{E4D7E63D-91F2-4366-A2C4-1B00C9E2590E}" type="slidenum">
               <a:rPr lang="zh-TW" altLang="en-US" smtClean="0"/>
               <a:pPr/>
-              <a:t>22</a:t>
+              <a:t>26</a:t>
             </a:fld>
             <a:endParaRPr lang="zh-TW" altLang="en-US"/>
           </a:p>
         </p:txBody>
       </p:sp>
-      <p:pic>
-        <p:nvPicPr>
-          <p:cNvPr id="7" name="Picture 6">
-            <a:extLst>
-              <a:ext uri="{FF2B5EF4-FFF2-40B4-BE49-F238E27FC236}">
-                <a16:creationId xmlns:a16="http://schemas.microsoft.com/office/drawing/2014/main" id="{CCF4C88A-2EDF-49CA-9210-855FA42021A2}"/>
-              </a:ext>
-            </a:extLst>
-          </p:cNvPr>
-          <p:cNvPicPr>
-            <a:picLocks noChangeAspect="1"/>
-          </p:cNvPicPr>
-          <p:nvPr/>
-        </p:nvPicPr>
-        <p:blipFill>
-          <a:blip r:embed="rId2"/>
-          <a:stretch>
-            <a:fillRect/>
-          </a:stretch>
-        </p:blipFill>
-        <p:spPr>
-          <a:xfrm>
-            <a:off x="472050" y="1766791"/>
-            <a:ext cx="4028091" cy="4038473"/>
-          </a:xfrm>
-          <a:prstGeom prst="rect">
-            <a:avLst/>
-          </a:prstGeom>
-          <a:ln>
-            <a:solidFill>
-              <a:srgbClr val="C00000"/>
-            </a:solidFill>
-          </a:ln>
-        </p:spPr>
-      </p:pic>
-      <p:pic>
-        <p:nvPicPr>
-          <p:cNvPr id="8" name="Picture 7">
-            <a:extLst>
-              <a:ext uri="{FF2B5EF4-FFF2-40B4-BE49-F238E27FC236}">
-                <a16:creationId xmlns:a16="http://schemas.microsoft.com/office/drawing/2014/main" id="{AEECAB3D-EE2D-42F3-9B4B-92D131955FE3}"/>
-              </a:ext>
-            </a:extLst>
-          </p:cNvPr>
-          <p:cNvPicPr>
-            <a:picLocks noChangeAspect="1"/>
-          </p:cNvPicPr>
-          <p:nvPr/>
-        </p:nvPicPr>
-        <p:blipFill>
-          <a:blip r:embed="rId3"/>
-          <a:stretch>
-            <a:fillRect/>
-          </a:stretch>
-        </p:blipFill>
-        <p:spPr>
-          <a:xfrm>
-            <a:off x="4572001" y="1807861"/>
-            <a:ext cx="4183758" cy="2557243"/>
-          </a:xfrm>
-          <a:prstGeom prst="rect">
-            <a:avLst/>
-          </a:prstGeom>
-          <a:ln>
-            <a:solidFill>
-              <a:srgbClr val="C00000"/>
-            </a:solidFill>
-          </a:ln>
-        </p:spPr>
-      </p:pic>
     </p:spTree>
     <p:extLst>
       <p:ext uri="{BB962C8B-B14F-4D97-AF65-F5344CB8AC3E}">
-        <p14:creationId xmlns:p14="http://schemas.microsoft.com/office/powerpoint/2010/main" val="1954138917"/>
+        <p14:creationId xmlns:p14="http://schemas.microsoft.com/office/powerpoint/2010/main" val="1532121768"/>
       </p:ext>
     </p:extLst>
   </p:cSld>
@@ -11448,7 +13355,7 @@
 </p:sld>
 </file>
 
-<file path=ppt/slides/slide23.xml><?xml version="1.0" encoding="utf-8"?>
+<file path=ppt/slides/slide27.xml><?xml version="1.0" encoding="utf-8"?>
 <p:sld xmlns:a="http://schemas.openxmlformats.org/drawingml/2006/main" xmlns:r="http://schemas.openxmlformats.org/officeDocument/2006/relationships" xmlns:p="http://schemas.openxmlformats.org/presentationml/2006/main">
   <p:cSld>
     <p:spTree>
@@ -11480,9 +13387,32 @@
             <a:off x="0" y="2130425"/>
             <a:ext cx="9144000" cy="1470025"/>
           </a:xfrm>
-          <a:solidFill>
-            <a:srgbClr val="00B0F0"/>
-          </a:solidFill>
+          <a:gradFill flip="none" rotWithShape="1">
+            <a:gsLst>
+              <a:gs pos="0">
+                <a:srgbClr val="00B0F0">
+                  <a:shade val="30000"/>
+                  <a:satMod val="115000"/>
+                </a:srgbClr>
+              </a:gs>
+              <a:gs pos="50000">
+                <a:srgbClr val="00B0F0">
+                  <a:shade val="67500"/>
+                  <a:satMod val="115000"/>
+                </a:srgbClr>
+              </a:gs>
+              <a:gs pos="100000">
+                <a:srgbClr val="00B0F0">
+                  <a:shade val="100000"/>
+                  <a:satMod val="115000"/>
+                </a:srgbClr>
+              </a:gs>
+            </a:gsLst>
+            <a:path path="circle">
+              <a:fillToRect t="100000" r="100000"/>
+            </a:path>
+            <a:tileRect l="-100000" b="-100000"/>
+          </a:gradFill>
         </p:spPr>
         <p:txBody>
           <a:bodyPr>
@@ -11491,14 +13421,14 @@
           <a:lstStyle/>
           <a:p>
             <a:r>
-              <a:rPr lang="en-US" altLang="zh-TW" sz="4800" b="1" dirty="0">
+              <a:rPr lang="en-US" altLang="zh-TW" sz="6000" b="1" dirty="0">
                 <a:solidFill>
                   <a:srgbClr val="FFFF00"/>
                 </a:solidFill>
               </a:rPr>
-              <a:t>10.5 Summary</a:t>
-            </a:r>
-            <a:endParaRPr lang="zh-TW" altLang="en-US" sz="4800" b="1" dirty="0">
+              <a:t>End of Chapter</a:t>
+            </a:r>
+            <a:endParaRPr lang="zh-TW" altLang="en-US" sz="6000" b="1" dirty="0">
               <a:solidFill>
                 <a:srgbClr val="FFFF00"/>
               </a:solidFill>
@@ -11508,36 +13438,6 @@
       </p:sp>
       <p:sp>
         <p:nvSpPr>
-          <p:cNvPr id="3" name="副標題 2"/>
-          <p:cNvSpPr>
-            <a:spLocks noGrp="1"/>
-          </p:cNvSpPr>
-          <p:nvPr>
-            <p:ph type="subTitle" idx="1"/>
-          </p:nvPr>
-        </p:nvSpPr>
-        <p:spPr>
-          <a:xfrm>
-            <a:off x="1259632" y="4581128"/>
-            <a:ext cx="6400800" cy="694928"/>
-          </a:xfrm>
-        </p:spPr>
-        <p:txBody>
-          <a:bodyPr>
-            <a:normAutofit/>
-          </a:bodyPr>
-          <a:lstStyle/>
-          <a:p>
-            <a:r>
-              <a:rPr lang="en-US" altLang="zh-TW" dirty="0"/>
-              <a:t>Peter H. Chen</a:t>
-            </a:r>
-            <a:endParaRPr lang="zh-TW" altLang="en-US" dirty="0"/>
-          </a:p>
-        </p:txBody>
-      </p:sp>
-      <p:sp>
-        <p:nvSpPr>
           <p:cNvPr id="5" name="日期版面配置區 4"/>
           <p:cNvSpPr>
             <a:spLocks noGrp="1"/>
@@ -11551,10 +13451,10 @@
           <a:bodyPr/>
           <a:lstStyle/>
           <a:p>
-            <a:fld id="{C389EDC9-19E3-47AC-9C57-C6A24DEA81AD}" type="datetime1">
+            <a:fld id="{4E46BE27-E923-4EC2-B046-3272AE2A3E5C}" type="datetime1">
               <a:rPr lang="zh-TW" altLang="en-US" smtClean="0"/>
               <a:pPr/>
-              <a:t>2019/4/1</a:t>
+              <a:t>2019/4/6</a:t>
             </a:fld>
             <a:endParaRPr lang="zh-TW" altLang="en-US"/>
           </a:p>
@@ -11578,48 +13478,13 @@
             <a:fld id="{E4D7E63D-91F2-4366-A2C4-1B00C9E2590E}" type="slidenum">
               <a:rPr lang="zh-TW" altLang="en-US" smtClean="0"/>
               <a:pPr/>
-              <a:t>23</a:t>
+              <a:t>27</a:t>
             </a:fld>
             <a:endParaRPr lang="zh-TW" altLang="en-US"/>
           </a:p>
         </p:txBody>
       </p:sp>
-      <p:pic>
-        <p:nvPicPr>
-          <p:cNvPr id="4" name="Picture 3">
-            <a:extLst>
-              <a:ext uri="{FF2B5EF4-FFF2-40B4-BE49-F238E27FC236}">
-                <a16:creationId xmlns:a16="http://schemas.microsoft.com/office/drawing/2014/main" id="{7A4D60E2-93C7-4A51-A7EE-54D2D57FE8B6}"/>
-              </a:ext>
-            </a:extLst>
-          </p:cNvPr>
-          <p:cNvPicPr>
-            <a:picLocks noChangeAspect="1"/>
-          </p:cNvPicPr>
-          <p:nvPr/>
-        </p:nvPicPr>
-        <p:blipFill>
-          <a:blip r:embed="rId2"/>
-          <a:stretch>
-            <a:fillRect/>
-          </a:stretch>
-        </p:blipFill>
-        <p:spPr>
-          <a:xfrm>
-            <a:off x="3851920" y="3717032"/>
-            <a:ext cx="1202568" cy="990350"/>
-          </a:xfrm>
-          <a:prstGeom prst="rect">
-            <a:avLst/>
-          </a:prstGeom>
-        </p:spPr>
-      </p:pic>
     </p:spTree>
-    <p:extLst>
-      <p:ext uri="{BB962C8B-B14F-4D97-AF65-F5344CB8AC3E}">
-        <p14:creationId xmlns:p14="http://schemas.microsoft.com/office/powerpoint/2010/main" val="1098277510"/>
-      </p:ext>
-    </p:extLst>
   </p:cSld>
   <p:clrMapOvr>
     <a:masterClrMapping/>
@@ -11627,7 +13492,7 @@
 </p:sld>
 </file>
 
-<file path=ppt/slides/slide24.xml><?xml version="1.0" encoding="utf-8"?>
+<file path=ppt/slides/slide3.xml><?xml version="1.0" encoding="utf-8"?>
 <p:sld xmlns:a="http://schemas.openxmlformats.org/drawingml/2006/main" xmlns:r="http://schemas.openxmlformats.org/officeDocument/2006/relationships" xmlns:p="http://schemas.openxmlformats.org/presentationml/2006/main">
   <p:cSld>
     <p:spTree>
@@ -11699,7 +13564,7 @@
                   <a:srgbClr val="FFFF00"/>
                 </a:solidFill>
               </a:rPr>
-              <a:t>10.4 ch1004_nerualNetwork.py</a:t>
+              <a:t>10 Number Guesser</a:t>
             </a:r>
             <a:endParaRPr lang="zh-TW" altLang="en-US" b="1" dirty="0">
               <a:solidFill>
@@ -11721,8 +13586,8 @@
         </p:nvSpPr>
         <p:spPr>
           <a:xfrm>
-            <a:off x="472050" y="1214422"/>
-            <a:ext cx="6980270" cy="630402"/>
+            <a:off x="467544" y="1268759"/>
+            <a:ext cx="8352928" cy="936106"/>
           </a:xfrm>
           <a:ln>
             <a:solidFill>
@@ -11750,23 +13615,25 @@
                   <a:schemeClr val="tx1"/>
                 </a:solidFill>
               </a:rPr>
-              <a:t>This section shows write </a:t>
-            </a:r>
-            <a:r>
-              <a:rPr lang="en-US" sz="1600">
-                <a:solidFill>
-                  <a:schemeClr val="tx1"/>
-                </a:solidFill>
-              </a:rPr>
-              <a:t>model data, digit </a:t>
-            </a:r>
+              <a:t>In this project, I use Visual Studio Code for Editor.</a:t>
+            </a:r>
+          </a:p>
+          <a:p>
+            <a:pPr marL="342900" indent="-342900" algn="l">
+              <a:buClr>
+                <a:srgbClr val="0070C0"/>
+              </a:buClr>
+              <a:buSzPct val="80000"/>
+              <a:buFont typeface="Wingdings" pitchFamily="2" charset="2"/>
+              <a:buChar char="u"/>
+            </a:pPr>
             <a:r>
               <a:rPr lang="en-US" sz="1600" dirty="0">
                 <a:solidFill>
                   <a:schemeClr val="tx1"/>
                 </a:solidFill>
               </a:rPr>
-              <a:t>predict, hand writing prediction, and tensorflow neural network.</a:t>
+              <a:t>The explorer shown here include four programs: ch1001_createModel.py,  ch1002_testNetwork.py, ch1003_drawNumber.py, and ch1004_neural_network.py.</a:t>
             </a:r>
           </a:p>
         </p:txBody>
@@ -11868,430 +13735,7 @@
             <a:fld id="{A4F910E6-8D00-4BAF-8C48-9688E0B449D3}" type="datetime1">
               <a:rPr lang="zh-TW" altLang="en-US" smtClean="0"/>
               <a:pPr/>
-              <a:t>2019/4/1</a:t>
-            </a:fld>
-            <a:endParaRPr lang="zh-TW" altLang="en-US"/>
-          </a:p>
-        </p:txBody>
-      </p:sp>
-      <p:sp>
-        <p:nvSpPr>
-          <p:cNvPr id="6" name="投影片編號版面配置區 5"/>
-          <p:cNvSpPr>
-            <a:spLocks noGrp="1"/>
-          </p:cNvSpPr>
-          <p:nvPr>
-            <p:ph type="sldNum" sz="quarter" idx="12"/>
-          </p:nvPr>
-        </p:nvSpPr>
-        <p:spPr/>
-        <p:txBody>
-          <a:bodyPr/>
-          <a:lstStyle/>
-          <a:p>
-            <a:fld id="{E4D7E63D-91F2-4366-A2C4-1B00C9E2590E}" type="slidenum">
-              <a:rPr lang="zh-TW" altLang="en-US" smtClean="0"/>
-              <a:pPr/>
-              <a:t>24</a:t>
-            </a:fld>
-            <a:endParaRPr lang="zh-TW" altLang="en-US"/>
-          </a:p>
-        </p:txBody>
-      </p:sp>
-    </p:spTree>
-    <p:extLst>
-      <p:ext uri="{BB962C8B-B14F-4D97-AF65-F5344CB8AC3E}">
-        <p14:creationId xmlns:p14="http://schemas.microsoft.com/office/powerpoint/2010/main" val="1532121768"/>
-      </p:ext>
-    </p:extLst>
-  </p:cSld>
-  <p:clrMapOvr>
-    <a:masterClrMapping/>
-  </p:clrMapOvr>
-</p:sld>
-</file>
-
-<file path=ppt/slides/slide25.xml><?xml version="1.0" encoding="utf-8"?>
-<p:sld xmlns:a="http://schemas.openxmlformats.org/drawingml/2006/main" xmlns:r="http://schemas.openxmlformats.org/officeDocument/2006/relationships" xmlns:p="http://schemas.openxmlformats.org/presentationml/2006/main">
-  <p:cSld>
-    <p:spTree>
-      <p:nvGrpSpPr>
-        <p:cNvPr id="1" name=""/>
-        <p:cNvGrpSpPr/>
-        <p:nvPr/>
-      </p:nvGrpSpPr>
-      <p:grpSpPr>
-        <a:xfrm>
-          <a:off x="0" y="0"/>
-          <a:ext cx="0" cy="0"/>
-          <a:chOff x="0" y="0"/>
-          <a:chExt cx="0" cy="0"/>
-        </a:xfrm>
-      </p:grpSpPr>
-      <p:sp>
-        <p:nvSpPr>
-          <p:cNvPr id="2" name="標題 1"/>
-          <p:cNvSpPr>
-            <a:spLocks noGrp="1"/>
-          </p:cNvSpPr>
-          <p:nvPr>
-            <p:ph type="ctrTitle"/>
-          </p:nvPr>
-        </p:nvSpPr>
-        <p:spPr>
-          <a:xfrm>
-            <a:off x="0" y="2130425"/>
-            <a:ext cx="9144000" cy="1470025"/>
-          </a:xfrm>
-          <a:gradFill flip="none" rotWithShape="1">
-            <a:gsLst>
-              <a:gs pos="0">
-                <a:srgbClr val="00B0F0">
-                  <a:shade val="30000"/>
-                  <a:satMod val="115000"/>
-                </a:srgbClr>
-              </a:gs>
-              <a:gs pos="50000">
-                <a:srgbClr val="00B0F0">
-                  <a:shade val="67500"/>
-                  <a:satMod val="115000"/>
-                </a:srgbClr>
-              </a:gs>
-              <a:gs pos="100000">
-                <a:srgbClr val="00B0F0">
-                  <a:shade val="100000"/>
-                  <a:satMod val="115000"/>
-                </a:srgbClr>
-              </a:gs>
-            </a:gsLst>
-            <a:path path="circle">
-              <a:fillToRect t="100000" r="100000"/>
-            </a:path>
-            <a:tileRect l="-100000" b="-100000"/>
-          </a:gradFill>
-        </p:spPr>
-        <p:txBody>
-          <a:bodyPr>
-            <a:normAutofit/>
-          </a:bodyPr>
-          <a:lstStyle/>
-          <a:p>
-            <a:r>
-              <a:rPr lang="en-US" altLang="zh-TW" sz="6000" b="1" dirty="0">
-                <a:solidFill>
-                  <a:srgbClr val="FFFF00"/>
-                </a:solidFill>
-              </a:rPr>
-              <a:t>End of Chapter</a:t>
-            </a:r>
-            <a:endParaRPr lang="zh-TW" altLang="en-US" sz="6000" b="1" dirty="0">
-              <a:solidFill>
-                <a:srgbClr val="FFFF00"/>
-              </a:solidFill>
-            </a:endParaRPr>
-          </a:p>
-        </p:txBody>
-      </p:sp>
-      <p:sp>
-        <p:nvSpPr>
-          <p:cNvPr id="5" name="日期版面配置區 4"/>
-          <p:cNvSpPr>
-            <a:spLocks noGrp="1"/>
-          </p:cNvSpPr>
-          <p:nvPr>
-            <p:ph type="dt" sz="half" idx="10"/>
-          </p:nvPr>
-        </p:nvSpPr>
-        <p:spPr/>
-        <p:txBody>
-          <a:bodyPr/>
-          <a:lstStyle/>
-          <a:p>
-            <a:fld id="{4E46BE27-E923-4EC2-B046-3272AE2A3E5C}" type="datetime1">
-              <a:rPr lang="zh-TW" altLang="en-US" smtClean="0"/>
-              <a:pPr/>
-              <a:t>2019/4/1</a:t>
-            </a:fld>
-            <a:endParaRPr lang="zh-TW" altLang="en-US"/>
-          </a:p>
-        </p:txBody>
-      </p:sp>
-      <p:sp>
-        <p:nvSpPr>
-          <p:cNvPr id="6" name="投影片編號版面配置區 5"/>
-          <p:cNvSpPr>
-            <a:spLocks noGrp="1"/>
-          </p:cNvSpPr>
-          <p:nvPr>
-            <p:ph type="sldNum" sz="quarter" idx="12"/>
-          </p:nvPr>
-        </p:nvSpPr>
-        <p:spPr/>
-        <p:txBody>
-          <a:bodyPr/>
-          <a:lstStyle/>
-          <a:p>
-            <a:fld id="{E4D7E63D-91F2-4366-A2C4-1B00C9E2590E}" type="slidenum">
-              <a:rPr lang="zh-TW" altLang="en-US" smtClean="0"/>
-              <a:pPr/>
-              <a:t>25</a:t>
-            </a:fld>
-            <a:endParaRPr lang="zh-TW" altLang="en-US"/>
-          </a:p>
-        </p:txBody>
-      </p:sp>
-    </p:spTree>
-  </p:cSld>
-  <p:clrMapOvr>
-    <a:masterClrMapping/>
-  </p:clrMapOvr>
-</p:sld>
-</file>
-
-<file path=ppt/slides/slide3.xml><?xml version="1.0" encoding="utf-8"?>
-<p:sld xmlns:a="http://schemas.openxmlformats.org/drawingml/2006/main" xmlns:r="http://schemas.openxmlformats.org/officeDocument/2006/relationships" xmlns:p="http://schemas.openxmlformats.org/presentationml/2006/main">
-  <p:cSld>
-    <p:spTree>
-      <p:nvGrpSpPr>
-        <p:cNvPr id="1" name=""/>
-        <p:cNvGrpSpPr/>
-        <p:nvPr/>
-      </p:nvGrpSpPr>
-      <p:grpSpPr>
-        <a:xfrm>
-          <a:off x="0" y="0"/>
-          <a:ext cx="0" cy="0"/>
-          <a:chOff x="0" y="0"/>
-          <a:chExt cx="0" cy="0"/>
-        </a:xfrm>
-      </p:grpSpPr>
-      <p:sp>
-        <p:nvSpPr>
-          <p:cNvPr id="2" name="標題 1"/>
-          <p:cNvSpPr>
-            <a:spLocks noGrp="1"/>
-          </p:cNvSpPr>
-          <p:nvPr>
-            <p:ph type="ctrTitle"/>
-          </p:nvPr>
-        </p:nvSpPr>
-        <p:spPr>
-          <a:xfrm>
-            <a:off x="0" y="1"/>
-            <a:ext cx="9144000" cy="764704"/>
-          </a:xfrm>
-          <a:gradFill flip="none" rotWithShape="1">
-            <a:gsLst>
-              <a:gs pos="0">
-                <a:srgbClr val="C00000">
-                  <a:shade val="30000"/>
-                  <a:satMod val="115000"/>
-                </a:srgbClr>
-              </a:gs>
-              <a:gs pos="50000">
-                <a:srgbClr val="C00000">
-                  <a:shade val="67500"/>
-                  <a:satMod val="115000"/>
-                </a:srgbClr>
-              </a:gs>
-              <a:gs pos="100000">
-                <a:srgbClr val="C00000">
-                  <a:shade val="100000"/>
-                  <a:satMod val="115000"/>
-                </a:srgbClr>
-              </a:gs>
-            </a:gsLst>
-            <a:path path="circle">
-              <a:fillToRect t="100000" r="100000"/>
-            </a:path>
-            <a:tileRect l="-100000" b="-100000"/>
-          </a:gradFill>
-        </p:spPr>
-        <p:txBody>
-          <a:bodyPr>
-            <a:normAutofit/>
-          </a:bodyPr>
-          <a:lstStyle/>
-          <a:p>
-            <a:pPr algn="l"/>
-            <a:r>
-              <a:rPr lang="en-US" altLang="zh-TW" b="1" dirty="0">
-                <a:solidFill>
-                  <a:srgbClr val="FFFF00"/>
-                </a:solidFill>
-              </a:rPr>
-              <a:t>10 Number Guesser</a:t>
-            </a:r>
-            <a:endParaRPr lang="zh-TW" altLang="en-US" b="1" dirty="0">
-              <a:solidFill>
-                <a:srgbClr val="FFFF00"/>
-              </a:solidFill>
-            </a:endParaRPr>
-          </a:p>
-        </p:txBody>
-      </p:sp>
-      <p:sp>
-        <p:nvSpPr>
-          <p:cNvPr id="3" name="副標題 2"/>
-          <p:cNvSpPr>
-            <a:spLocks noGrp="1"/>
-          </p:cNvSpPr>
-          <p:nvPr>
-            <p:ph type="subTitle" idx="1"/>
-          </p:nvPr>
-        </p:nvSpPr>
-        <p:spPr>
-          <a:xfrm>
-            <a:off x="467544" y="1268759"/>
-            <a:ext cx="8352928" cy="936106"/>
-          </a:xfrm>
-          <a:ln>
-            <a:solidFill>
-              <a:srgbClr val="C00000"/>
-            </a:solidFill>
-          </a:ln>
-        </p:spPr>
-        <p:txBody>
-          <a:bodyPr>
-            <a:noAutofit/>
-          </a:bodyPr>
-          <a:lstStyle/>
-          <a:p>
-            <a:pPr marL="342900" indent="-342900" algn="l">
-              <a:buClr>
-                <a:srgbClr val="0070C0"/>
-              </a:buClr>
-              <a:buSzPct val="80000"/>
-              <a:buFont typeface="Wingdings" pitchFamily="2" charset="2"/>
-              <a:buChar char="u"/>
-            </a:pPr>
-            <a:r>
-              <a:rPr lang="en-US" sz="1600" dirty="0">
-                <a:solidFill>
-                  <a:schemeClr val="tx1"/>
-                </a:solidFill>
-              </a:rPr>
-              <a:t>In this project, I use Visual Studio Code for Editor.</a:t>
-            </a:r>
-          </a:p>
-          <a:p>
-            <a:pPr marL="342900" indent="-342900" algn="l">
-              <a:buClr>
-                <a:srgbClr val="0070C0"/>
-              </a:buClr>
-              <a:buSzPct val="80000"/>
-              <a:buFont typeface="Wingdings" pitchFamily="2" charset="2"/>
-              <a:buChar char="u"/>
-            </a:pPr>
-            <a:r>
-              <a:rPr lang="en-US" sz="1600" dirty="0">
-                <a:solidFill>
-                  <a:schemeClr val="tx1"/>
-                </a:solidFill>
-              </a:rPr>
-              <a:t>The explorer shown here include four programs: ch1001_createModel.py,  ch1002_testNetwork.py, ch1003_drawNumber.py, and ch1004_neural_network.py.</a:t>
-            </a:r>
-          </a:p>
-        </p:txBody>
-      </p:sp>
-      <p:sp>
-        <p:nvSpPr>
-          <p:cNvPr id="4" name="標題 1"/>
-          <p:cNvSpPr txBox="1">
-            <a:spLocks/>
-          </p:cNvSpPr>
-          <p:nvPr/>
-        </p:nvSpPr>
-        <p:spPr>
-          <a:xfrm>
-            <a:off x="0" y="764704"/>
-            <a:ext cx="9144000" cy="360040"/>
-          </a:xfrm>
-          <a:prstGeom prst="rect">
-            <a:avLst/>
-          </a:prstGeom>
-          <a:gradFill flip="none" rotWithShape="1">
-            <a:gsLst>
-              <a:gs pos="0">
-                <a:srgbClr val="00B0F0">
-                  <a:shade val="30000"/>
-                  <a:satMod val="115000"/>
-                </a:srgbClr>
-              </a:gs>
-              <a:gs pos="50000">
-                <a:srgbClr val="00B0F0">
-                  <a:shade val="67500"/>
-                  <a:satMod val="115000"/>
-                </a:srgbClr>
-              </a:gs>
-              <a:gs pos="100000">
-                <a:srgbClr val="00B0F0">
-                  <a:shade val="100000"/>
-                  <a:satMod val="115000"/>
-                </a:srgbClr>
-              </a:gs>
-            </a:gsLst>
-            <a:path path="circle">
-              <a:fillToRect t="100000" r="100000"/>
-            </a:path>
-            <a:tileRect l="-100000" b="-100000"/>
-          </a:gradFill>
-        </p:spPr>
-        <p:txBody>
-          <a:bodyPr vert="horz" lIns="91440" tIns="45720" rIns="91440" bIns="45720" rtlCol="0" anchor="ctr">
-            <a:normAutofit/>
-          </a:bodyPr>
-          <a:lstStyle/>
-          <a:p>
-            <a:pPr lvl="0">
-              <a:spcBef>
-                <a:spcPct val="0"/>
-              </a:spcBef>
-            </a:pPr>
-            <a:r>
-              <a:rPr lang="en-US" altLang="zh-TW" sz="1600" dirty="0">
-                <a:latin typeface="+mj-lt"/>
-                <a:ea typeface="+mj-ea"/>
-                <a:cs typeface="+mj-cs"/>
-              </a:rPr>
-              <a:t>https://www.youtube.com/watch?v=jNW97izstLg&amp;t=10s</a:t>
-            </a:r>
-            <a:endParaRPr kumimoji="0" lang="zh-TW" altLang="en-US" sz="1600" b="0" i="0" u="none" strike="noStrike" kern="1200" cap="none" spc="0" normalizeH="0" baseline="0" noProof="0" dirty="0">
-              <a:ln>
-                <a:noFill/>
-              </a:ln>
-              <a:solidFill>
-                <a:schemeClr val="tx1"/>
-              </a:solidFill>
-              <a:effectLst/>
-              <a:uLnTx/>
-              <a:uFillTx/>
-              <a:latin typeface="+mj-lt"/>
-              <a:ea typeface="+mj-ea"/>
-              <a:cs typeface="+mj-cs"/>
-            </a:endParaRPr>
-          </a:p>
-        </p:txBody>
-      </p:sp>
-      <p:sp>
-        <p:nvSpPr>
-          <p:cNvPr id="5" name="日期版面配置區 4"/>
-          <p:cNvSpPr>
-            <a:spLocks noGrp="1"/>
-          </p:cNvSpPr>
-          <p:nvPr>
-            <p:ph type="dt" sz="half" idx="10"/>
-          </p:nvPr>
-        </p:nvSpPr>
-        <p:spPr/>
-        <p:txBody>
-          <a:bodyPr/>
-          <a:lstStyle/>
-          <a:p>
-            <a:fld id="{A4F910E6-8D00-4BAF-8C48-9688E0B449D3}" type="datetime1">
-              <a:rPr lang="zh-TW" altLang="en-US" smtClean="0"/>
-              <a:pPr/>
-              <a:t>2019/4/1</a:t>
+              <a:t>2019/4/6</a:t>
             </a:fld>
             <a:endParaRPr lang="zh-TW" altLang="en-US"/>
           </a:p>
@@ -12718,7 +14162,7 @@
             <a:fld id="{A4F910E6-8D00-4BAF-8C48-9688E0B449D3}" type="datetime1">
               <a:rPr lang="zh-TW" altLang="en-US" smtClean="0"/>
               <a:pPr/>
-              <a:t>2019/4/1</a:t>
+              <a:t>2019/4/6</a:t>
             </a:fld>
             <a:endParaRPr lang="zh-TW" altLang="en-US"/>
           </a:p>
@@ -12867,7 +14311,7 @@
             <a:fld id="{C389EDC9-19E3-47AC-9C57-C6A24DEA81AD}" type="datetime1">
               <a:rPr lang="zh-TW" altLang="en-US" smtClean="0"/>
               <a:pPr/>
-              <a:t>2019/4/1</a:t>
+              <a:t>2019/4/6</a:t>
             </a:fld>
             <a:endParaRPr lang="zh-TW" altLang="en-US"/>
           </a:p>
@@ -13183,7 +14627,7 @@
             <a:fld id="{A4F910E6-8D00-4BAF-8C48-9688E0B449D3}" type="datetime1">
               <a:rPr lang="zh-TW" altLang="en-US" smtClean="0"/>
               <a:pPr/>
-              <a:t>2019/4/1</a:t>
+              <a:t>2019/4/6</a:t>
             </a:fld>
             <a:endParaRPr lang="zh-TW" altLang="en-US"/>
           </a:p>
@@ -14861,7 +16305,7 @@
             <a:fld id="{A4F910E6-8D00-4BAF-8C48-9688E0B449D3}" type="datetime1">
               <a:rPr lang="zh-TW" altLang="en-US" smtClean="0"/>
               <a:pPr/>
-              <a:t>2019/4/1</a:t>
+              <a:t>2019/4/6</a:t>
             </a:fld>
             <a:endParaRPr lang="zh-TW" altLang="en-US"/>
           </a:p>
@@ -16694,7 +18138,7 @@
             <a:fld id="{A4F910E6-8D00-4BAF-8C48-9688E0B449D3}" type="datetime1">
               <a:rPr lang="zh-TW" altLang="en-US" smtClean="0"/>
               <a:pPr/>
-              <a:t>2019/4/1</a:t>
+              <a:t>2019/4/6</a:t>
             </a:fld>
             <a:endParaRPr lang="zh-TW" altLang="en-US"/>
           </a:p>
@@ -16885,7 +18329,7 @@
         </p:nvSpPr>
         <p:spPr>
           <a:xfrm>
-            <a:off x="3723511" y="3648837"/>
+            <a:off x="3851920" y="3640980"/>
             <a:ext cx="2448272" cy="516454"/>
           </a:xfrm>
           <a:prstGeom prst="rect">
@@ -16980,6 +18424,82 @@
           <a:p>
             <a:pPr algn="ctr"/>
             <a:endParaRPr lang="en-US"/>
+          </a:p>
+        </p:txBody>
+      </p:sp>
+      <p:sp>
+        <p:nvSpPr>
+          <p:cNvPr id="12" name="Rectangle 11">
+            <a:extLst>
+              <a:ext uri="{FF2B5EF4-FFF2-40B4-BE49-F238E27FC236}">
+                <a16:creationId xmlns:a16="http://schemas.microsoft.com/office/drawing/2014/main" id="{6A19C015-129B-45EC-A4E3-29C05B61721A}"/>
+              </a:ext>
+            </a:extLst>
+          </p:cNvPr>
+          <p:cNvSpPr/>
+          <p:nvPr/>
+        </p:nvSpPr>
+        <p:spPr>
+          <a:xfrm>
+            <a:off x="3851920" y="4318207"/>
+            <a:ext cx="3523583" cy="516454"/>
+          </a:xfrm>
+          <a:prstGeom prst="rect">
+            <a:avLst/>
+          </a:prstGeom>
+          <a:solidFill>
+            <a:srgbClr val="FFFF00"/>
+          </a:solidFill>
+          <a:ln>
+            <a:solidFill>
+              <a:srgbClr val="C00000"/>
+            </a:solidFill>
+          </a:ln>
+        </p:spPr>
+        <p:style>
+          <a:lnRef idx="2">
+            <a:schemeClr val="accent1">
+              <a:shade val="50000"/>
+            </a:schemeClr>
+          </a:lnRef>
+          <a:fillRef idx="1">
+            <a:schemeClr val="accent1"/>
+          </a:fillRef>
+          <a:effectRef idx="0">
+            <a:schemeClr val="accent1"/>
+          </a:effectRef>
+          <a:fontRef idx="minor">
+            <a:schemeClr val="lt1"/>
+          </a:fontRef>
+        </p:style>
+        <p:txBody>
+          <a:bodyPr rtlCol="0" anchor="ctr"/>
+          <a:lstStyle/>
+          <a:p>
+            <a:r>
+              <a:rPr lang="en-US" dirty="0">
+                <a:solidFill>
+                  <a:schemeClr val="tx1"/>
+                </a:solidFill>
+              </a:rPr>
+              <a:t>for many class classification select: </a:t>
+            </a:r>
+            <a:r>
+              <a:rPr lang="en-US" dirty="0" err="1">
+                <a:solidFill>
+                  <a:schemeClr val="tx1"/>
+                </a:solidFill>
+              </a:rPr>
+              <a:t>Categorical_cross_entropy</a:t>
+            </a:r>
+            <a:r>
+              <a:rPr lang="en-US" dirty="0">
+                <a:solidFill>
+                  <a:schemeClr val="tx1"/>
+                </a:solidFill>
+              </a:rPr>
+              <a:t> </a:t>
+            </a:r>
           </a:p>
         </p:txBody>
       </p:sp>
@@ -17236,7 +18756,7 @@
             <a:fld id="{A4F910E6-8D00-4BAF-8C48-9688E0B449D3}" type="datetime1">
               <a:rPr lang="zh-TW" altLang="en-US" smtClean="0"/>
               <a:pPr/>
-              <a:t>2019/4/1</a:t>
+              <a:t>2019/4/6</a:t>
             </a:fld>
             <a:endParaRPr lang="zh-TW" altLang="en-US"/>
           </a:p>

</xml_diff>